<commit_message>
Improvement for presentation for Workshop 2
</commit_message>
<xml_diff>
--- a/2/presentation/React 2.pptx
+++ b/2/presentation/React 2.pptx
@@ -5,22 +5,23 @@
     <p:sldMasterId id="2147483648" r:id="rId1"/>
   </p:sldMasterIdLst>
   <p:notesMasterIdLst>
-    <p:notesMasterId r:id="rId15"/>
+    <p:notesMasterId r:id="rId16"/>
   </p:notesMasterIdLst>
   <p:sldIdLst>
     <p:sldId id="361" r:id="rId2"/>
-    <p:sldId id="360" r:id="rId3"/>
-    <p:sldId id="362" r:id="rId4"/>
-    <p:sldId id="365" r:id="rId5"/>
-    <p:sldId id="363" r:id="rId6"/>
-    <p:sldId id="338" r:id="rId7"/>
-    <p:sldId id="354" r:id="rId8"/>
-    <p:sldId id="339" r:id="rId9"/>
-    <p:sldId id="364" r:id="rId10"/>
-    <p:sldId id="355" r:id="rId11"/>
-    <p:sldId id="357" r:id="rId12"/>
-    <p:sldId id="358" r:id="rId13"/>
-    <p:sldId id="359" r:id="rId14"/>
+    <p:sldId id="265" r:id="rId3"/>
+    <p:sldId id="360" r:id="rId4"/>
+    <p:sldId id="362" r:id="rId5"/>
+    <p:sldId id="365" r:id="rId6"/>
+    <p:sldId id="363" r:id="rId7"/>
+    <p:sldId id="338" r:id="rId8"/>
+    <p:sldId id="354" r:id="rId9"/>
+    <p:sldId id="339" r:id="rId10"/>
+    <p:sldId id="364" r:id="rId11"/>
+    <p:sldId id="355" r:id="rId12"/>
+    <p:sldId id="357" r:id="rId13"/>
+    <p:sldId id="358" r:id="rId14"/>
+    <p:sldId id="359" r:id="rId15"/>
   </p:sldIdLst>
   <p:sldSz cx="12192000" cy="6858000"/>
   <p:notesSz cx="6858000" cy="9144000"/>
@@ -221,7 +222,7 @@
           <a:p>
             <a:fld id="{A7D59A82-B575-4226-8A09-A5B072479177}" type="datetimeFigureOut">
               <a:rPr lang="pl-PL" smtClean="0"/>
-              <a:t>06.10.2021</a:t>
+              <a:t>07.10.2021</a:t>
             </a:fld>
             <a:endParaRPr lang="pl-PL"/>
           </a:p>
@@ -561,7 +562,7 @@
           <a:p>
             <a:fld id="{F89D2610-1426-4EFD-83D2-2399D4353A5D}" type="slidenum">
               <a:rPr lang="pl-PL" smtClean="0"/>
-              <a:t>8</a:t>
+              <a:t>9</a:t>
             </a:fld>
             <a:endParaRPr lang="pl-PL"/>
           </a:p>
@@ -645,7 +646,7 @@
           <a:p>
             <a:fld id="{F89D2610-1426-4EFD-83D2-2399D4353A5D}" type="slidenum">
               <a:rPr lang="pl-PL" smtClean="0"/>
-              <a:t>12</a:t>
+              <a:t>13</a:t>
             </a:fld>
             <a:endParaRPr lang="pl-PL"/>
           </a:p>
@@ -729,7 +730,7 @@
           <a:p>
             <a:fld id="{F89D2610-1426-4EFD-83D2-2399D4353A5D}" type="slidenum">
               <a:rPr lang="pl-PL" smtClean="0"/>
-              <a:t>13</a:t>
+              <a:t>14</a:t>
             </a:fld>
             <a:endParaRPr lang="pl-PL"/>
           </a:p>
@@ -897,7 +898,7 @@
           <a:p>
             <a:fld id="{5E543113-3ECC-4DC9-B636-16B32516798D}" type="datetimeFigureOut">
               <a:rPr lang="pl-PL" smtClean="0"/>
-              <a:t>06.10.2021</a:t>
+              <a:t>07.10.2021</a:t>
             </a:fld>
             <a:endParaRPr lang="pl-PL"/>
           </a:p>
@@ -1097,7 +1098,7 @@
           <a:p>
             <a:fld id="{5E543113-3ECC-4DC9-B636-16B32516798D}" type="datetimeFigureOut">
               <a:rPr lang="pl-PL" smtClean="0"/>
-              <a:t>06.10.2021</a:t>
+              <a:t>07.10.2021</a:t>
             </a:fld>
             <a:endParaRPr lang="pl-PL"/>
           </a:p>
@@ -1307,7 +1308,7 @@
           <a:p>
             <a:fld id="{5E543113-3ECC-4DC9-B636-16B32516798D}" type="datetimeFigureOut">
               <a:rPr lang="pl-PL" smtClean="0"/>
-              <a:t>06.10.2021</a:t>
+              <a:t>07.10.2021</a:t>
             </a:fld>
             <a:endParaRPr lang="pl-PL"/>
           </a:p>
@@ -1507,7 +1508,7 @@
           <a:p>
             <a:fld id="{5E543113-3ECC-4DC9-B636-16B32516798D}" type="datetimeFigureOut">
               <a:rPr lang="pl-PL" smtClean="0"/>
-              <a:t>06.10.2021</a:t>
+              <a:t>07.10.2021</a:t>
             </a:fld>
             <a:endParaRPr lang="pl-PL"/>
           </a:p>
@@ -1783,7 +1784,7 @@
           <a:p>
             <a:fld id="{5E543113-3ECC-4DC9-B636-16B32516798D}" type="datetimeFigureOut">
               <a:rPr lang="pl-PL" smtClean="0"/>
-              <a:t>06.10.2021</a:t>
+              <a:t>07.10.2021</a:t>
             </a:fld>
             <a:endParaRPr lang="pl-PL"/>
           </a:p>
@@ -2051,7 +2052,7 @@
           <a:p>
             <a:fld id="{5E543113-3ECC-4DC9-B636-16B32516798D}" type="datetimeFigureOut">
               <a:rPr lang="pl-PL" smtClean="0"/>
-              <a:t>06.10.2021</a:t>
+              <a:t>07.10.2021</a:t>
             </a:fld>
             <a:endParaRPr lang="pl-PL"/>
           </a:p>
@@ -2466,7 +2467,7 @@
           <a:p>
             <a:fld id="{5E543113-3ECC-4DC9-B636-16B32516798D}" type="datetimeFigureOut">
               <a:rPr lang="pl-PL" smtClean="0"/>
-              <a:t>06.10.2021</a:t>
+              <a:t>07.10.2021</a:t>
             </a:fld>
             <a:endParaRPr lang="pl-PL"/>
           </a:p>
@@ -2608,7 +2609,7 @@
           <a:p>
             <a:fld id="{5E543113-3ECC-4DC9-B636-16B32516798D}" type="datetimeFigureOut">
               <a:rPr lang="pl-PL" smtClean="0"/>
-              <a:t>06.10.2021</a:t>
+              <a:t>07.10.2021</a:t>
             </a:fld>
             <a:endParaRPr lang="pl-PL"/>
           </a:p>
@@ -2721,7 +2722,7 @@
           <a:p>
             <a:fld id="{5E543113-3ECC-4DC9-B636-16B32516798D}" type="datetimeFigureOut">
               <a:rPr lang="pl-PL" smtClean="0"/>
-              <a:t>06.10.2021</a:t>
+              <a:t>07.10.2021</a:t>
             </a:fld>
             <a:endParaRPr lang="pl-PL"/>
           </a:p>
@@ -3034,7 +3035,7 @@
           <a:p>
             <a:fld id="{5E543113-3ECC-4DC9-B636-16B32516798D}" type="datetimeFigureOut">
               <a:rPr lang="pl-PL" smtClean="0"/>
-              <a:t>06.10.2021</a:t>
+              <a:t>07.10.2021</a:t>
             </a:fld>
             <a:endParaRPr lang="pl-PL"/>
           </a:p>
@@ -3323,7 +3324,7 @@
           <a:p>
             <a:fld id="{5E543113-3ECC-4DC9-B636-16B32516798D}" type="datetimeFigureOut">
               <a:rPr lang="pl-PL" smtClean="0"/>
-              <a:t>06.10.2021</a:t>
+              <a:t>07.10.2021</a:t>
             </a:fld>
             <a:endParaRPr lang="pl-PL"/>
           </a:p>
@@ -3566,7 +3567,7 @@
           <a:p>
             <a:fld id="{5E543113-3ECC-4DC9-B636-16B32516798D}" type="datetimeFigureOut">
               <a:rPr lang="pl-PL" smtClean="0"/>
-              <a:t>06.10.2021</a:t>
+              <a:t>07.10.2021</a:t>
             </a:fld>
             <a:endParaRPr lang="pl-PL"/>
           </a:p>
@@ -4783,6 +4784,1300 @@
           <a:chExt cx="0" cy="0"/>
         </a:xfrm>
       </p:grpSpPr>
+      <p:pic>
+        <p:nvPicPr>
+          <p:cNvPr id="26" name="Picture 25">
+            <a:extLst>
+              <a:ext uri="{FF2B5EF4-FFF2-40B4-BE49-F238E27FC236}">
+                <a16:creationId xmlns:a16="http://schemas.microsoft.com/office/drawing/2014/main" id="{AAF9970A-E073-4AF8-AF1D-B57F080827B7}"/>
+              </a:ext>
+            </a:extLst>
+          </p:cNvPr>
+          <p:cNvPicPr>
+            <a:picLocks noChangeAspect="1"/>
+          </p:cNvPicPr>
+          <p:nvPr/>
+        </p:nvPicPr>
+        <p:blipFill>
+          <a:blip r:embed="rId2"/>
+          <a:stretch>
+            <a:fillRect/>
+          </a:stretch>
+        </p:blipFill>
+        <p:spPr>
+          <a:xfrm>
+            <a:off x="838200" y="2042078"/>
+            <a:ext cx="9747738" cy="2499159"/>
+          </a:xfrm>
+          <a:prstGeom prst="rect">
+            <a:avLst/>
+          </a:prstGeom>
+        </p:spPr>
+      </p:pic>
+      <p:sp>
+        <p:nvSpPr>
+          <p:cNvPr id="2" name="Title 1">
+            <a:extLst>
+              <a:ext uri="{FF2B5EF4-FFF2-40B4-BE49-F238E27FC236}">
+                <a16:creationId xmlns:a16="http://schemas.microsoft.com/office/drawing/2014/main" id="{7F6BCDD3-50C0-4950-853C-38B03F912153}"/>
+              </a:ext>
+            </a:extLst>
+          </p:cNvPr>
+          <p:cNvSpPr>
+            <a:spLocks noGrp="1"/>
+          </p:cNvSpPr>
+          <p:nvPr>
+            <p:ph type="title"/>
+          </p:nvPr>
+        </p:nvSpPr>
+        <p:spPr/>
+        <p:txBody>
+          <a:bodyPr/>
+          <a:lstStyle/>
+          <a:p>
+            <a:r>
+              <a:rPr lang="pl-PL" dirty="0" err="1"/>
+              <a:t>Page</a:t>
+            </a:r>
+            <a:r>
+              <a:rPr lang="pl-PL" dirty="0"/>
+              <a:t> not </a:t>
+            </a:r>
+            <a:r>
+              <a:rPr lang="pl-PL" dirty="0" err="1"/>
+              <a:t>found</a:t>
+            </a:r>
+            <a:endParaRPr lang="pl-PL" dirty="0"/>
+          </a:p>
+        </p:txBody>
+      </p:sp>
+      <p:sp>
+        <p:nvSpPr>
+          <p:cNvPr id="6" name="Rectangle 5">
+            <a:extLst>
+              <a:ext uri="{FF2B5EF4-FFF2-40B4-BE49-F238E27FC236}">
+                <a16:creationId xmlns:a16="http://schemas.microsoft.com/office/drawing/2014/main" id="{DAFE0565-112F-4752-898F-A0F3D605EC28}"/>
+              </a:ext>
+            </a:extLst>
+          </p:cNvPr>
+          <p:cNvSpPr/>
+          <p:nvPr/>
+        </p:nvSpPr>
+        <p:spPr>
+          <a:xfrm>
+            <a:off x="838200" y="3509602"/>
+            <a:ext cx="2643554" cy="550984"/>
+          </a:xfrm>
+          <a:prstGeom prst="rect">
+            <a:avLst/>
+          </a:prstGeom>
+        </p:spPr>
+        <p:style>
+          <a:lnRef idx="2">
+            <a:schemeClr val="accent6">
+              <a:shade val="50000"/>
+            </a:schemeClr>
+          </a:lnRef>
+          <a:fillRef idx="1">
+            <a:schemeClr val="accent6"/>
+          </a:fillRef>
+          <a:effectRef idx="0">
+            <a:schemeClr val="accent6"/>
+          </a:effectRef>
+          <a:fontRef idx="minor">
+            <a:schemeClr val="lt1"/>
+          </a:fontRef>
+        </p:style>
+        <p:txBody>
+          <a:bodyPr rtlCol="0" anchor="ctr"/>
+          <a:lstStyle/>
+          <a:p>
+            <a:pPr algn="ctr"/>
+            <a:r>
+              <a:rPr lang="pl-PL" dirty="0"/>
+              <a:t>App.js</a:t>
+            </a:r>
+          </a:p>
+        </p:txBody>
+      </p:sp>
+      <p:sp>
+        <p:nvSpPr>
+          <p:cNvPr id="7" name="TextBox 6">
+            <a:extLst>
+              <a:ext uri="{FF2B5EF4-FFF2-40B4-BE49-F238E27FC236}">
+                <a16:creationId xmlns:a16="http://schemas.microsoft.com/office/drawing/2014/main" id="{1BC91E6D-E4E7-4E28-883E-A51B546DE4EE}"/>
+              </a:ext>
+            </a:extLst>
+          </p:cNvPr>
+          <p:cNvSpPr txBox="1"/>
+          <p:nvPr/>
+        </p:nvSpPr>
+        <p:spPr>
+          <a:xfrm>
+            <a:off x="838200" y="4060586"/>
+            <a:ext cx="9747738" cy="1938992"/>
+          </a:xfrm>
+          <a:prstGeom prst="rect">
+            <a:avLst/>
+          </a:prstGeom>
+          <a:noFill/>
+          <a:ln>
+            <a:solidFill>
+              <a:schemeClr val="accent1">
+                <a:shade val="50000"/>
+              </a:schemeClr>
+            </a:solidFill>
+          </a:ln>
+        </p:spPr>
+        <p:txBody>
+          <a:bodyPr wrap="square" rtlCol="0">
+            <a:spAutoFit/>
+          </a:bodyPr>
+          <a:lstStyle/>
+          <a:p>
+            <a:r>
+              <a:rPr lang="pl-PL" sz="2000" b="0" dirty="0">
+                <a:solidFill>
+                  <a:srgbClr val="808080"/>
+                </a:solidFill>
+                <a:effectLst/>
+                <a:latin typeface="Consolas" panose="020B0609020204030204" pitchFamily="49" charset="0"/>
+              </a:rPr>
+              <a:t>&lt;</a:t>
+            </a:r>
+            <a:r>
+              <a:rPr lang="pl-PL" sz="2000" b="0" dirty="0">
+                <a:solidFill>
+                  <a:srgbClr val="00B050"/>
+                </a:solidFill>
+                <a:effectLst/>
+                <a:latin typeface="Consolas" panose="020B0609020204030204" pitchFamily="49" charset="0"/>
+              </a:rPr>
+              <a:t>Switch</a:t>
+            </a:r>
+            <a:r>
+              <a:rPr lang="pl-PL" sz="2000" b="0" dirty="0">
+                <a:solidFill>
+                  <a:srgbClr val="808080"/>
+                </a:solidFill>
+                <a:effectLst/>
+                <a:latin typeface="Consolas" panose="020B0609020204030204" pitchFamily="49" charset="0"/>
+              </a:rPr>
+              <a:t>&gt;</a:t>
+            </a:r>
+            <a:endParaRPr lang="pl-PL" sz="2000" b="0" dirty="0">
+              <a:solidFill>
+                <a:srgbClr val="D4D4D4"/>
+              </a:solidFill>
+              <a:effectLst/>
+              <a:latin typeface="Consolas" panose="020B0609020204030204" pitchFamily="49" charset="0"/>
+            </a:endParaRPr>
+          </a:p>
+          <a:p>
+            <a:r>
+              <a:rPr lang="pl-PL" sz="2000" b="0" dirty="0">
+                <a:solidFill>
+                  <a:srgbClr val="D4D4D4"/>
+                </a:solidFill>
+                <a:effectLst/>
+                <a:latin typeface="Consolas" panose="020B0609020204030204" pitchFamily="49" charset="0"/>
+              </a:rPr>
+              <a:t>    </a:t>
+            </a:r>
+            <a:r>
+              <a:rPr lang="pl-PL" sz="2000" b="0" dirty="0">
+                <a:solidFill>
+                  <a:srgbClr val="808080"/>
+                </a:solidFill>
+                <a:effectLst/>
+                <a:latin typeface="Consolas" panose="020B0609020204030204" pitchFamily="49" charset="0"/>
+              </a:rPr>
+              <a:t>&lt;</a:t>
+            </a:r>
+            <a:r>
+              <a:rPr lang="pl-PL" sz="2000" b="0" dirty="0" err="1">
+                <a:solidFill>
+                  <a:srgbClr val="00B050"/>
+                </a:solidFill>
+                <a:effectLst/>
+                <a:latin typeface="Consolas" panose="020B0609020204030204" pitchFamily="49" charset="0"/>
+              </a:rPr>
+              <a:t>Route</a:t>
+            </a:r>
+            <a:r>
+              <a:rPr lang="pl-PL" sz="2000" b="0" dirty="0">
+                <a:solidFill>
+                  <a:srgbClr val="D4D4D4"/>
+                </a:solidFill>
+                <a:effectLst/>
+                <a:latin typeface="Consolas" panose="020B0609020204030204" pitchFamily="49" charset="0"/>
+              </a:rPr>
+              <a:t> </a:t>
+            </a:r>
+            <a:r>
+              <a:rPr lang="pl-PL" sz="2000" b="0" dirty="0" err="1">
+                <a:solidFill>
+                  <a:srgbClr val="00B0F0"/>
+                </a:solidFill>
+                <a:effectLst/>
+                <a:latin typeface="Consolas" panose="020B0609020204030204" pitchFamily="49" charset="0"/>
+              </a:rPr>
+              <a:t>path</a:t>
+            </a:r>
+            <a:r>
+              <a:rPr lang="pl-PL" sz="2000" b="0" dirty="0">
+                <a:solidFill>
+                  <a:schemeClr val="bg1">
+                    <a:lumMod val="50000"/>
+                  </a:schemeClr>
+                </a:solidFill>
+                <a:effectLst/>
+                <a:latin typeface="Consolas" panose="020B0609020204030204" pitchFamily="49" charset="0"/>
+              </a:rPr>
+              <a:t>=</a:t>
+            </a:r>
+            <a:r>
+              <a:rPr lang="pl-PL" sz="2000" b="0" dirty="0">
+                <a:solidFill>
+                  <a:srgbClr val="C00000"/>
+                </a:solidFill>
+                <a:effectLst/>
+                <a:latin typeface="Consolas" panose="020B0609020204030204" pitchFamily="49" charset="0"/>
+              </a:rPr>
+              <a:t>"/"</a:t>
+            </a:r>
+            <a:r>
+              <a:rPr lang="pl-PL" sz="2000" b="0" dirty="0">
+                <a:solidFill>
+                  <a:srgbClr val="D4D4D4"/>
+                </a:solidFill>
+                <a:effectLst/>
+                <a:latin typeface="Consolas" panose="020B0609020204030204" pitchFamily="49" charset="0"/>
+              </a:rPr>
+              <a:t> </a:t>
+            </a:r>
+            <a:r>
+              <a:rPr lang="pl-PL" sz="2000" b="0" dirty="0" err="1">
+                <a:solidFill>
+                  <a:srgbClr val="00B0F0"/>
+                </a:solidFill>
+                <a:effectLst/>
+                <a:latin typeface="Consolas" panose="020B0609020204030204" pitchFamily="49" charset="0"/>
+              </a:rPr>
+              <a:t>exact</a:t>
+            </a:r>
+            <a:r>
+              <a:rPr lang="pl-PL" sz="2000" b="0" dirty="0">
+                <a:solidFill>
+                  <a:srgbClr val="D4D4D4"/>
+                </a:solidFill>
+                <a:effectLst/>
+                <a:latin typeface="Consolas" panose="020B0609020204030204" pitchFamily="49" charset="0"/>
+              </a:rPr>
+              <a:t> </a:t>
+            </a:r>
+            <a:r>
+              <a:rPr lang="pl-PL" sz="2000" b="0" dirty="0">
+                <a:solidFill>
+                  <a:srgbClr val="00B0F0"/>
+                </a:solidFill>
+                <a:effectLst/>
+                <a:latin typeface="Consolas" panose="020B0609020204030204" pitchFamily="49" charset="0"/>
+              </a:rPr>
+              <a:t>component</a:t>
+            </a:r>
+            <a:r>
+              <a:rPr lang="pl-PL" sz="2000" b="0" dirty="0">
+                <a:solidFill>
+                  <a:schemeClr val="bg1">
+                    <a:lumMod val="50000"/>
+                  </a:schemeClr>
+                </a:solidFill>
+                <a:effectLst/>
+                <a:latin typeface="Consolas" panose="020B0609020204030204" pitchFamily="49" charset="0"/>
+              </a:rPr>
+              <a:t>=</a:t>
+            </a:r>
+            <a:r>
+              <a:rPr lang="pl-PL" sz="2000" b="0" dirty="0">
+                <a:solidFill>
+                  <a:srgbClr val="569CD6"/>
+                </a:solidFill>
+                <a:effectLst/>
+                <a:latin typeface="Consolas" panose="020B0609020204030204" pitchFamily="49" charset="0"/>
+              </a:rPr>
+              <a:t>{</a:t>
+            </a:r>
+            <a:r>
+              <a:rPr lang="pl-PL" sz="2000" b="0" dirty="0" err="1">
+                <a:solidFill>
+                  <a:srgbClr val="FFC000"/>
+                </a:solidFill>
+                <a:effectLst/>
+                <a:latin typeface="Consolas" panose="020B0609020204030204" pitchFamily="49" charset="0"/>
+              </a:rPr>
+              <a:t>Welcome</a:t>
+            </a:r>
+            <a:r>
+              <a:rPr lang="pl-PL" sz="2000" b="0" dirty="0">
+                <a:solidFill>
+                  <a:srgbClr val="569CD6"/>
+                </a:solidFill>
+                <a:effectLst/>
+                <a:latin typeface="Consolas" panose="020B0609020204030204" pitchFamily="49" charset="0"/>
+              </a:rPr>
+              <a:t>}</a:t>
+            </a:r>
+            <a:r>
+              <a:rPr lang="pl-PL" sz="2000" b="0" dirty="0">
+                <a:solidFill>
+                  <a:srgbClr val="808080"/>
+                </a:solidFill>
+                <a:effectLst/>
+                <a:latin typeface="Consolas" panose="020B0609020204030204" pitchFamily="49" charset="0"/>
+              </a:rPr>
+              <a:t>&gt;&lt;/</a:t>
+            </a:r>
+            <a:r>
+              <a:rPr lang="pl-PL" sz="2000" b="0" dirty="0" err="1">
+                <a:solidFill>
+                  <a:srgbClr val="00B050"/>
+                </a:solidFill>
+                <a:effectLst/>
+                <a:latin typeface="Consolas" panose="020B0609020204030204" pitchFamily="49" charset="0"/>
+              </a:rPr>
+              <a:t>Route</a:t>
+            </a:r>
+            <a:r>
+              <a:rPr lang="pl-PL" sz="2000" b="0" dirty="0">
+                <a:solidFill>
+                  <a:srgbClr val="808080"/>
+                </a:solidFill>
+                <a:effectLst/>
+                <a:latin typeface="Consolas" panose="020B0609020204030204" pitchFamily="49" charset="0"/>
+              </a:rPr>
+              <a:t>&gt;</a:t>
+            </a:r>
+            <a:endParaRPr lang="pl-PL" sz="2000" b="0" dirty="0">
+              <a:solidFill>
+                <a:srgbClr val="D4D4D4"/>
+              </a:solidFill>
+              <a:effectLst/>
+              <a:latin typeface="Consolas" panose="020B0609020204030204" pitchFamily="49" charset="0"/>
+            </a:endParaRPr>
+          </a:p>
+          <a:p>
+            <a:r>
+              <a:rPr lang="pl-PL" sz="2000" b="0" dirty="0">
+                <a:solidFill>
+                  <a:srgbClr val="D4D4D4"/>
+                </a:solidFill>
+                <a:effectLst/>
+                <a:latin typeface="Consolas" panose="020B0609020204030204" pitchFamily="49" charset="0"/>
+              </a:rPr>
+              <a:t>    </a:t>
+            </a:r>
+            <a:r>
+              <a:rPr lang="pl-PL" sz="2000" b="0" dirty="0">
+                <a:solidFill>
+                  <a:srgbClr val="808080"/>
+                </a:solidFill>
+                <a:effectLst/>
+                <a:latin typeface="Consolas" panose="020B0609020204030204" pitchFamily="49" charset="0"/>
+              </a:rPr>
+              <a:t>&lt;</a:t>
+            </a:r>
+            <a:r>
+              <a:rPr lang="pl-PL" sz="2000" b="0" dirty="0" err="1">
+                <a:solidFill>
+                  <a:srgbClr val="00B050"/>
+                </a:solidFill>
+                <a:effectLst/>
+                <a:latin typeface="Consolas" panose="020B0609020204030204" pitchFamily="49" charset="0"/>
+              </a:rPr>
+              <a:t>Route</a:t>
+            </a:r>
+            <a:r>
+              <a:rPr lang="pl-PL" sz="2000" b="0" dirty="0">
+                <a:solidFill>
+                  <a:srgbClr val="D4D4D4"/>
+                </a:solidFill>
+                <a:effectLst/>
+                <a:latin typeface="Consolas" panose="020B0609020204030204" pitchFamily="49" charset="0"/>
+              </a:rPr>
+              <a:t> </a:t>
+            </a:r>
+            <a:r>
+              <a:rPr lang="pl-PL" sz="2000" b="0" dirty="0" err="1">
+                <a:solidFill>
+                  <a:srgbClr val="00B0F0"/>
+                </a:solidFill>
+                <a:effectLst/>
+                <a:latin typeface="Consolas" panose="020B0609020204030204" pitchFamily="49" charset="0"/>
+              </a:rPr>
+              <a:t>path</a:t>
+            </a:r>
+            <a:r>
+              <a:rPr lang="pl-PL" sz="2000" b="0" dirty="0">
+                <a:solidFill>
+                  <a:schemeClr val="bg1">
+                    <a:lumMod val="50000"/>
+                  </a:schemeClr>
+                </a:solidFill>
+                <a:effectLst/>
+                <a:latin typeface="Consolas" panose="020B0609020204030204" pitchFamily="49" charset="0"/>
+              </a:rPr>
+              <a:t>=</a:t>
+            </a:r>
+            <a:r>
+              <a:rPr lang="pl-PL" sz="2000" b="0" dirty="0">
+                <a:solidFill>
+                  <a:srgbClr val="C00000"/>
+                </a:solidFill>
+                <a:effectLst/>
+                <a:latin typeface="Consolas" panose="020B0609020204030204" pitchFamily="49" charset="0"/>
+              </a:rPr>
+              <a:t>"/</a:t>
+            </a:r>
+            <a:r>
+              <a:rPr lang="pl-PL" sz="2000" b="0" dirty="0" err="1">
+                <a:solidFill>
+                  <a:srgbClr val="C00000"/>
+                </a:solidFill>
+                <a:effectLst/>
+                <a:latin typeface="Consolas" panose="020B0609020204030204" pitchFamily="49" charset="0"/>
+              </a:rPr>
+              <a:t>heroes</a:t>
+            </a:r>
+            <a:r>
+              <a:rPr lang="pl-PL" sz="2000" b="0" dirty="0">
+                <a:solidFill>
+                  <a:srgbClr val="C00000"/>
+                </a:solidFill>
+                <a:effectLst/>
+                <a:latin typeface="Consolas" panose="020B0609020204030204" pitchFamily="49" charset="0"/>
+              </a:rPr>
+              <a:t>"</a:t>
+            </a:r>
+            <a:r>
+              <a:rPr lang="pl-PL" sz="2000" b="0" dirty="0">
+                <a:solidFill>
+                  <a:srgbClr val="D4D4D4"/>
+                </a:solidFill>
+                <a:effectLst/>
+                <a:latin typeface="Consolas" panose="020B0609020204030204" pitchFamily="49" charset="0"/>
+              </a:rPr>
+              <a:t> </a:t>
+            </a:r>
+            <a:r>
+              <a:rPr lang="pl-PL" sz="2000" b="0" dirty="0">
+                <a:solidFill>
+                  <a:srgbClr val="00B0F0"/>
+                </a:solidFill>
+                <a:effectLst/>
+                <a:latin typeface="Consolas" panose="020B0609020204030204" pitchFamily="49" charset="0"/>
+              </a:rPr>
+              <a:t>component</a:t>
+            </a:r>
+            <a:r>
+              <a:rPr lang="pl-PL" sz="2000" b="0" dirty="0">
+                <a:solidFill>
+                  <a:schemeClr val="bg1">
+                    <a:lumMod val="50000"/>
+                  </a:schemeClr>
+                </a:solidFill>
+                <a:effectLst/>
+                <a:latin typeface="Consolas" panose="020B0609020204030204" pitchFamily="49" charset="0"/>
+              </a:rPr>
+              <a:t>=</a:t>
+            </a:r>
+            <a:r>
+              <a:rPr lang="pl-PL" sz="2000" b="0" dirty="0">
+                <a:solidFill>
+                  <a:srgbClr val="569CD6"/>
+                </a:solidFill>
+                <a:effectLst/>
+                <a:latin typeface="Consolas" panose="020B0609020204030204" pitchFamily="49" charset="0"/>
+              </a:rPr>
+              <a:t>{</a:t>
+            </a:r>
+            <a:r>
+              <a:rPr lang="pl-PL" sz="2000" b="0" dirty="0" err="1">
+                <a:solidFill>
+                  <a:srgbClr val="00B050"/>
+                </a:solidFill>
+                <a:effectLst/>
+                <a:latin typeface="Consolas" panose="020B0609020204030204" pitchFamily="49" charset="0"/>
+              </a:rPr>
+              <a:t>HeroesList</a:t>
+            </a:r>
+            <a:r>
+              <a:rPr lang="pl-PL" sz="2000" b="0" dirty="0">
+                <a:solidFill>
+                  <a:srgbClr val="569CD6"/>
+                </a:solidFill>
+                <a:effectLst/>
+                <a:latin typeface="Consolas" panose="020B0609020204030204" pitchFamily="49" charset="0"/>
+              </a:rPr>
+              <a:t>}</a:t>
+            </a:r>
+            <a:r>
+              <a:rPr lang="pl-PL" sz="2000" b="0" dirty="0">
+                <a:solidFill>
+                  <a:srgbClr val="808080"/>
+                </a:solidFill>
+                <a:effectLst/>
+                <a:latin typeface="Consolas" panose="020B0609020204030204" pitchFamily="49" charset="0"/>
+              </a:rPr>
+              <a:t>&gt;&lt;/</a:t>
+            </a:r>
+            <a:r>
+              <a:rPr lang="pl-PL" sz="2000" b="0" dirty="0" err="1">
+                <a:solidFill>
+                  <a:srgbClr val="00B050"/>
+                </a:solidFill>
+                <a:effectLst/>
+                <a:latin typeface="Consolas" panose="020B0609020204030204" pitchFamily="49" charset="0"/>
+              </a:rPr>
+              <a:t>Route</a:t>
+            </a:r>
+            <a:r>
+              <a:rPr lang="pl-PL" sz="2000" b="0" dirty="0">
+                <a:solidFill>
+                  <a:srgbClr val="808080"/>
+                </a:solidFill>
+                <a:effectLst/>
+                <a:latin typeface="Consolas" panose="020B0609020204030204" pitchFamily="49" charset="0"/>
+              </a:rPr>
+              <a:t>&gt;</a:t>
+            </a:r>
+            <a:endParaRPr lang="pl-PL" sz="2000" b="0" dirty="0">
+              <a:solidFill>
+                <a:srgbClr val="D4D4D4"/>
+              </a:solidFill>
+              <a:effectLst/>
+              <a:latin typeface="Consolas" panose="020B0609020204030204" pitchFamily="49" charset="0"/>
+            </a:endParaRPr>
+          </a:p>
+          <a:p>
+            <a:r>
+              <a:rPr lang="pl-PL" sz="2000" b="0" dirty="0">
+                <a:solidFill>
+                  <a:srgbClr val="D4D4D4"/>
+                </a:solidFill>
+                <a:effectLst/>
+                <a:latin typeface="Consolas" panose="020B0609020204030204" pitchFamily="49" charset="0"/>
+              </a:rPr>
+              <a:t>    </a:t>
+            </a:r>
+            <a:r>
+              <a:rPr lang="pl-PL" sz="2000" b="0" dirty="0">
+                <a:solidFill>
+                  <a:srgbClr val="808080"/>
+                </a:solidFill>
+                <a:effectLst/>
+                <a:latin typeface="Consolas" panose="020B0609020204030204" pitchFamily="49" charset="0"/>
+              </a:rPr>
+              <a:t>&lt;</a:t>
+            </a:r>
+            <a:r>
+              <a:rPr lang="pl-PL" sz="2000" b="0" dirty="0" err="1">
+                <a:solidFill>
+                  <a:srgbClr val="00B050"/>
+                </a:solidFill>
+                <a:effectLst/>
+                <a:latin typeface="Consolas" panose="020B0609020204030204" pitchFamily="49" charset="0"/>
+              </a:rPr>
+              <a:t>Route</a:t>
+            </a:r>
+            <a:r>
+              <a:rPr lang="pl-PL" sz="2000" b="0" dirty="0">
+                <a:solidFill>
+                  <a:srgbClr val="D4D4D4"/>
+                </a:solidFill>
+                <a:effectLst/>
+                <a:latin typeface="Consolas" panose="020B0609020204030204" pitchFamily="49" charset="0"/>
+              </a:rPr>
+              <a:t> </a:t>
+            </a:r>
+            <a:r>
+              <a:rPr lang="pl-PL" sz="2000" b="0" dirty="0">
+                <a:solidFill>
+                  <a:srgbClr val="00B0F0"/>
+                </a:solidFill>
+                <a:effectLst/>
+                <a:latin typeface="Consolas" panose="020B0609020204030204" pitchFamily="49" charset="0"/>
+              </a:rPr>
+              <a:t>component</a:t>
+            </a:r>
+            <a:r>
+              <a:rPr lang="pl-PL" sz="2000" b="0" dirty="0">
+                <a:solidFill>
+                  <a:schemeClr val="bg1">
+                    <a:lumMod val="50000"/>
+                  </a:schemeClr>
+                </a:solidFill>
+                <a:effectLst/>
+                <a:latin typeface="Consolas" panose="020B0609020204030204" pitchFamily="49" charset="0"/>
+              </a:rPr>
+              <a:t>=</a:t>
+            </a:r>
+            <a:r>
+              <a:rPr lang="pl-PL" sz="2000" b="0" dirty="0">
+                <a:solidFill>
+                  <a:srgbClr val="569CD6"/>
+                </a:solidFill>
+                <a:effectLst/>
+                <a:latin typeface="Consolas" panose="020B0609020204030204" pitchFamily="49" charset="0"/>
+              </a:rPr>
+              <a:t>{</a:t>
+            </a:r>
+            <a:r>
+              <a:rPr lang="pl-PL" sz="2000" b="0" dirty="0" err="1">
+                <a:solidFill>
+                  <a:srgbClr val="FFC000"/>
+                </a:solidFill>
+                <a:effectLst/>
+                <a:latin typeface="Consolas" panose="020B0609020204030204" pitchFamily="49" charset="0"/>
+              </a:rPr>
+              <a:t>PageNotFound</a:t>
+            </a:r>
+            <a:r>
+              <a:rPr lang="pl-PL" sz="2000" b="0" dirty="0">
+                <a:solidFill>
+                  <a:srgbClr val="569CD6"/>
+                </a:solidFill>
+                <a:effectLst/>
+                <a:latin typeface="Consolas" panose="020B0609020204030204" pitchFamily="49" charset="0"/>
+              </a:rPr>
+              <a:t>}</a:t>
+            </a:r>
+            <a:r>
+              <a:rPr lang="pl-PL" sz="2000" b="0" dirty="0">
+                <a:solidFill>
+                  <a:srgbClr val="808080"/>
+                </a:solidFill>
+                <a:effectLst/>
+                <a:latin typeface="Consolas" panose="020B0609020204030204" pitchFamily="49" charset="0"/>
+              </a:rPr>
+              <a:t>&gt;&lt;/</a:t>
+            </a:r>
+            <a:r>
+              <a:rPr lang="pl-PL" sz="2000" b="0" dirty="0" err="1">
+                <a:solidFill>
+                  <a:srgbClr val="00B050"/>
+                </a:solidFill>
+                <a:effectLst/>
+                <a:latin typeface="Consolas" panose="020B0609020204030204" pitchFamily="49" charset="0"/>
+              </a:rPr>
+              <a:t>Route</a:t>
+            </a:r>
+            <a:r>
+              <a:rPr lang="pl-PL" sz="2000" b="0" dirty="0">
+                <a:solidFill>
+                  <a:srgbClr val="808080"/>
+                </a:solidFill>
+                <a:effectLst/>
+                <a:latin typeface="Consolas" panose="020B0609020204030204" pitchFamily="49" charset="0"/>
+              </a:rPr>
+              <a:t>&gt;</a:t>
+            </a:r>
+            <a:endParaRPr lang="pl-PL" sz="2000" dirty="0">
+              <a:solidFill>
+                <a:srgbClr val="D4D4D4"/>
+              </a:solidFill>
+              <a:latin typeface="Consolas" panose="020B0609020204030204" pitchFamily="49" charset="0"/>
+            </a:endParaRPr>
+          </a:p>
+          <a:p>
+            <a:r>
+              <a:rPr lang="pl-PL" sz="2000" b="0" dirty="0">
+                <a:solidFill>
+                  <a:srgbClr val="808080"/>
+                </a:solidFill>
+                <a:effectLst/>
+                <a:latin typeface="Consolas" panose="020B0609020204030204" pitchFamily="49" charset="0"/>
+              </a:rPr>
+              <a:t>&lt;/</a:t>
+            </a:r>
+            <a:r>
+              <a:rPr lang="pl-PL" sz="2000" b="0" dirty="0">
+                <a:solidFill>
+                  <a:srgbClr val="00B050"/>
+                </a:solidFill>
+                <a:effectLst/>
+                <a:latin typeface="Consolas" panose="020B0609020204030204" pitchFamily="49" charset="0"/>
+              </a:rPr>
+              <a:t>Switch</a:t>
+            </a:r>
+            <a:r>
+              <a:rPr lang="pl-PL" sz="2000" b="0" dirty="0">
+                <a:solidFill>
+                  <a:srgbClr val="808080"/>
+                </a:solidFill>
+                <a:effectLst/>
+                <a:latin typeface="Consolas" panose="020B0609020204030204" pitchFamily="49" charset="0"/>
+              </a:rPr>
+              <a:t>&gt;</a:t>
+            </a:r>
+            <a:endParaRPr lang="pl-PL" sz="2000" b="0" dirty="0">
+              <a:solidFill>
+                <a:srgbClr val="D4D4D4"/>
+              </a:solidFill>
+              <a:effectLst/>
+              <a:latin typeface="Consolas" panose="020B0609020204030204" pitchFamily="49" charset="0"/>
+            </a:endParaRPr>
+          </a:p>
+          <a:p>
+            <a:endParaRPr lang="en-US" sz="2000" b="0" dirty="0">
+              <a:solidFill>
+                <a:srgbClr val="D4D4D4"/>
+              </a:solidFill>
+              <a:effectLst/>
+              <a:latin typeface="Consolas" panose="020B0609020204030204" pitchFamily="49" charset="0"/>
+            </a:endParaRPr>
+          </a:p>
+        </p:txBody>
+      </p:sp>
+      <p:pic>
+        <p:nvPicPr>
+          <p:cNvPr id="22" name="Picture 21">
+            <a:extLst>
+              <a:ext uri="{FF2B5EF4-FFF2-40B4-BE49-F238E27FC236}">
+                <a16:creationId xmlns:a16="http://schemas.microsoft.com/office/drawing/2014/main" id="{E6322520-ADD0-4634-A2F8-911A421A6683}"/>
+              </a:ext>
+            </a:extLst>
+          </p:cNvPr>
+          <p:cNvPicPr>
+            <a:picLocks noChangeAspect="1"/>
+          </p:cNvPicPr>
+          <p:nvPr/>
+        </p:nvPicPr>
+        <p:blipFill>
+          <a:blip r:embed="rId3"/>
+          <a:stretch>
+            <a:fillRect/>
+          </a:stretch>
+        </p:blipFill>
+        <p:spPr>
+          <a:xfrm>
+            <a:off x="838200" y="1590230"/>
+            <a:ext cx="9747738" cy="451848"/>
+          </a:xfrm>
+          <a:prstGeom prst="rect">
+            <a:avLst/>
+          </a:prstGeom>
+        </p:spPr>
+      </p:pic>
+    </p:spTree>
+    <p:extLst>
+      <p:ext uri="{BB962C8B-B14F-4D97-AF65-F5344CB8AC3E}">
+        <p14:creationId xmlns:p14="http://schemas.microsoft.com/office/powerpoint/2010/main" val="3674942756"/>
+      </p:ext>
+    </p:extLst>
+  </p:cSld>
+  <p:clrMapOvr>
+    <a:masterClrMapping/>
+  </p:clrMapOvr>
+  <p:timing>
+    <p:tnLst>
+      <p:par>
+        <p:cTn id="1" dur="indefinite" restart="never" nodeType="tmRoot">
+          <p:childTnLst>
+            <p:seq concurrent="1" nextAc="seek">
+              <p:cTn id="2" dur="indefinite" nodeType="mainSeq">
+                <p:childTnLst>
+                  <p:par>
+                    <p:cTn id="3" fill="hold">
+                      <p:stCondLst>
+                        <p:cond delay="indefinite"/>
+                      </p:stCondLst>
+                      <p:childTnLst>
+                        <p:par>
+                          <p:cTn id="4" fill="hold">
+                            <p:stCondLst>
+                              <p:cond delay="0"/>
+                            </p:stCondLst>
+                            <p:childTnLst>
+                              <p:par>
+                                <p:cTn id="5" presetID="10" presetClass="entr" presetSubtype="0" fill="hold" nodeType="clickEffect">
+                                  <p:stCondLst>
+                                    <p:cond delay="0"/>
+                                  </p:stCondLst>
+                                  <p:childTnLst>
+                                    <p:set>
+                                      <p:cBhvr>
+                                        <p:cTn id="6" dur="1" fill="hold">
+                                          <p:stCondLst>
+                                            <p:cond delay="0"/>
+                                          </p:stCondLst>
+                                        </p:cTn>
+                                        <p:tgtEl>
+                                          <p:spTgt spid="22"/>
+                                        </p:tgtEl>
+                                        <p:attrNameLst>
+                                          <p:attrName>style.visibility</p:attrName>
+                                        </p:attrNameLst>
+                                      </p:cBhvr>
+                                      <p:to>
+                                        <p:strVal val="visible"/>
+                                      </p:to>
+                                    </p:set>
+                                    <p:animEffect transition="in" filter="fade">
+                                      <p:cBhvr>
+                                        <p:cTn id="7" dur="500"/>
+                                        <p:tgtEl>
+                                          <p:spTgt spid="22"/>
+                                        </p:tgtEl>
+                                      </p:cBhvr>
+                                    </p:animEffect>
+                                  </p:childTnLst>
+                                </p:cTn>
+                              </p:par>
+                            </p:childTnLst>
+                          </p:cTn>
+                        </p:par>
+                      </p:childTnLst>
+                    </p:cTn>
+                  </p:par>
+                  <p:par>
+                    <p:cTn id="8" fill="hold">
+                      <p:stCondLst>
+                        <p:cond delay="indefinite"/>
+                      </p:stCondLst>
+                      <p:childTnLst>
+                        <p:par>
+                          <p:cTn id="9" fill="hold">
+                            <p:stCondLst>
+                              <p:cond delay="0"/>
+                            </p:stCondLst>
+                            <p:childTnLst>
+                              <p:par>
+                                <p:cTn id="10" presetID="10" presetClass="entr" presetSubtype="0" fill="hold" grpId="0" nodeType="clickEffect">
+                                  <p:stCondLst>
+                                    <p:cond delay="0"/>
+                                  </p:stCondLst>
+                                  <p:childTnLst>
+                                    <p:set>
+                                      <p:cBhvr>
+                                        <p:cTn id="11" dur="1" fill="hold">
+                                          <p:stCondLst>
+                                            <p:cond delay="0"/>
+                                          </p:stCondLst>
+                                        </p:cTn>
+                                        <p:tgtEl>
+                                          <p:spTgt spid="6"/>
+                                        </p:tgtEl>
+                                        <p:attrNameLst>
+                                          <p:attrName>style.visibility</p:attrName>
+                                        </p:attrNameLst>
+                                      </p:cBhvr>
+                                      <p:to>
+                                        <p:strVal val="visible"/>
+                                      </p:to>
+                                    </p:set>
+                                    <p:animEffect transition="in" filter="fade">
+                                      <p:cBhvr>
+                                        <p:cTn id="12" dur="500"/>
+                                        <p:tgtEl>
+                                          <p:spTgt spid="6"/>
+                                        </p:tgtEl>
+                                      </p:cBhvr>
+                                    </p:animEffect>
+                                  </p:childTnLst>
+                                </p:cTn>
+                              </p:par>
+                              <p:par>
+                                <p:cTn id="13" presetID="10" presetClass="entr" presetSubtype="0" fill="hold" grpId="0" nodeType="withEffect">
+                                  <p:stCondLst>
+                                    <p:cond delay="0"/>
+                                  </p:stCondLst>
+                                  <p:childTnLst>
+                                    <p:set>
+                                      <p:cBhvr>
+                                        <p:cTn id="14" dur="1" fill="hold">
+                                          <p:stCondLst>
+                                            <p:cond delay="0"/>
+                                          </p:stCondLst>
+                                        </p:cTn>
+                                        <p:tgtEl>
+                                          <p:spTgt spid="7"/>
+                                        </p:tgtEl>
+                                        <p:attrNameLst>
+                                          <p:attrName>style.visibility</p:attrName>
+                                        </p:attrNameLst>
+                                      </p:cBhvr>
+                                      <p:to>
+                                        <p:strVal val="visible"/>
+                                      </p:to>
+                                    </p:set>
+                                    <p:animEffect transition="in" filter="fade">
+                                      <p:cBhvr>
+                                        <p:cTn id="15" dur="500"/>
+                                        <p:tgtEl>
+                                          <p:spTgt spid="7"/>
+                                        </p:tgtEl>
+                                      </p:cBhvr>
+                                    </p:animEffect>
+                                  </p:childTnLst>
+                                </p:cTn>
+                              </p:par>
+                              <p:par>
+                                <p:cTn id="16" presetID="10" presetClass="entr" presetSubtype="0" fill="hold" nodeType="withEffect">
+                                  <p:stCondLst>
+                                    <p:cond delay="0"/>
+                                  </p:stCondLst>
+                                  <p:childTnLst>
+                                    <p:set>
+                                      <p:cBhvr>
+                                        <p:cTn id="17" dur="1" fill="hold">
+                                          <p:stCondLst>
+                                            <p:cond delay="0"/>
+                                          </p:stCondLst>
+                                        </p:cTn>
+                                        <p:tgtEl>
+                                          <p:spTgt spid="7">
+                                            <p:txEl>
+                                              <p:pRg st="1" end="1"/>
+                                            </p:txEl>
+                                          </p:spTgt>
+                                        </p:tgtEl>
+                                        <p:attrNameLst>
+                                          <p:attrName>style.visibility</p:attrName>
+                                        </p:attrNameLst>
+                                      </p:cBhvr>
+                                      <p:to>
+                                        <p:strVal val="visible"/>
+                                      </p:to>
+                                    </p:set>
+                                    <p:animEffect transition="in" filter="fade">
+                                      <p:cBhvr>
+                                        <p:cTn id="18" dur="500"/>
+                                        <p:tgtEl>
+                                          <p:spTgt spid="7">
+                                            <p:txEl>
+                                              <p:pRg st="1" end="1"/>
+                                            </p:txEl>
+                                          </p:spTgt>
+                                        </p:tgtEl>
+                                      </p:cBhvr>
+                                    </p:animEffect>
+                                  </p:childTnLst>
+                                </p:cTn>
+                              </p:par>
+                              <p:par>
+                                <p:cTn id="19" presetID="10" presetClass="entr" presetSubtype="0" fill="hold" nodeType="withEffect">
+                                  <p:stCondLst>
+                                    <p:cond delay="0"/>
+                                  </p:stCondLst>
+                                  <p:childTnLst>
+                                    <p:set>
+                                      <p:cBhvr>
+                                        <p:cTn id="20" dur="1" fill="hold">
+                                          <p:stCondLst>
+                                            <p:cond delay="0"/>
+                                          </p:stCondLst>
+                                        </p:cTn>
+                                        <p:tgtEl>
+                                          <p:spTgt spid="7">
+                                            <p:txEl>
+                                              <p:pRg st="2" end="2"/>
+                                            </p:txEl>
+                                          </p:spTgt>
+                                        </p:tgtEl>
+                                        <p:attrNameLst>
+                                          <p:attrName>style.visibility</p:attrName>
+                                        </p:attrNameLst>
+                                      </p:cBhvr>
+                                      <p:to>
+                                        <p:strVal val="visible"/>
+                                      </p:to>
+                                    </p:set>
+                                    <p:animEffect transition="in" filter="fade">
+                                      <p:cBhvr>
+                                        <p:cTn id="21" dur="500"/>
+                                        <p:tgtEl>
+                                          <p:spTgt spid="7">
+                                            <p:txEl>
+                                              <p:pRg st="2" end="2"/>
+                                            </p:txEl>
+                                          </p:spTgt>
+                                        </p:tgtEl>
+                                      </p:cBhvr>
+                                    </p:animEffect>
+                                  </p:childTnLst>
+                                </p:cTn>
+                              </p:par>
+                            </p:childTnLst>
+                          </p:cTn>
+                        </p:par>
+                      </p:childTnLst>
+                    </p:cTn>
+                  </p:par>
+                  <p:par>
+                    <p:cTn id="22" fill="hold">
+                      <p:stCondLst>
+                        <p:cond delay="indefinite"/>
+                      </p:stCondLst>
+                      <p:childTnLst>
+                        <p:par>
+                          <p:cTn id="23" fill="hold">
+                            <p:stCondLst>
+                              <p:cond delay="0"/>
+                            </p:stCondLst>
+                            <p:childTnLst>
+                              <p:par>
+                                <p:cTn id="24" presetID="10" presetClass="entr" presetSubtype="0" fill="hold" nodeType="clickEffect">
+                                  <p:stCondLst>
+                                    <p:cond delay="0"/>
+                                  </p:stCondLst>
+                                  <p:childTnLst>
+                                    <p:set>
+                                      <p:cBhvr>
+                                        <p:cTn id="25" dur="1" fill="hold">
+                                          <p:stCondLst>
+                                            <p:cond delay="0"/>
+                                          </p:stCondLst>
+                                        </p:cTn>
+                                        <p:tgtEl>
+                                          <p:spTgt spid="7">
+                                            <p:txEl>
+                                              <p:pRg st="3" end="3"/>
+                                            </p:txEl>
+                                          </p:spTgt>
+                                        </p:tgtEl>
+                                        <p:attrNameLst>
+                                          <p:attrName>style.visibility</p:attrName>
+                                        </p:attrNameLst>
+                                      </p:cBhvr>
+                                      <p:to>
+                                        <p:strVal val="visible"/>
+                                      </p:to>
+                                    </p:set>
+                                    <p:animEffect transition="in" filter="fade">
+                                      <p:cBhvr>
+                                        <p:cTn id="26" dur="500"/>
+                                        <p:tgtEl>
+                                          <p:spTgt spid="7">
+                                            <p:txEl>
+                                              <p:pRg st="3" end="3"/>
+                                            </p:txEl>
+                                          </p:spTgt>
+                                        </p:tgtEl>
+                                      </p:cBhvr>
+                                    </p:animEffect>
+                                  </p:childTnLst>
+                                </p:cTn>
+                              </p:par>
+                            </p:childTnLst>
+                          </p:cTn>
+                        </p:par>
+                      </p:childTnLst>
+                    </p:cTn>
+                  </p:par>
+                  <p:par>
+                    <p:cTn id="27" fill="hold">
+                      <p:stCondLst>
+                        <p:cond delay="indefinite"/>
+                      </p:stCondLst>
+                      <p:childTnLst>
+                        <p:par>
+                          <p:cTn id="28" fill="hold">
+                            <p:stCondLst>
+                              <p:cond delay="0"/>
+                            </p:stCondLst>
+                            <p:childTnLst>
+                              <p:par>
+                                <p:cTn id="29" presetID="10" presetClass="entr" presetSubtype="0" fill="hold" nodeType="clickEffect">
+                                  <p:stCondLst>
+                                    <p:cond delay="0"/>
+                                  </p:stCondLst>
+                                  <p:childTnLst>
+                                    <p:set>
+                                      <p:cBhvr>
+                                        <p:cTn id="30" dur="1" fill="hold">
+                                          <p:stCondLst>
+                                            <p:cond delay="0"/>
+                                          </p:stCondLst>
+                                        </p:cTn>
+                                        <p:tgtEl>
+                                          <p:spTgt spid="7">
+                                            <p:txEl>
+                                              <p:pRg st="0" end="0"/>
+                                            </p:txEl>
+                                          </p:spTgt>
+                                        </p:tgtEl>
+                                        <p:attrNameLst>
+                                          <p:attrName>style.visibility</p:attrName>
+                                        </p:attrNameLst>
+                                      </p:cBhvr>
+                                      <p:to>
+                                        <p:strVal val="visible"/>
+                                      </p:to>
+                                    </p:set>
+                                    <p:animEffect transition="in" filter="fade">
+                                      <p:cBhvr>
+                                        <p:cTn id="31" dur="500"/>
+                                        <p:tgtEl>
+                                          <p:spTgt spid="7">
+                                            <p:txEl>
+                                              <p:pRg st="0" end="0"/>
+                                            </p:txEl>
+                                          </p:spTgt>
+                                        </p:tgtEl>
+                                      </p:cBhvr>
+                                    </p:animEffect>
+                                  </p:childTnLst>
+                                </p:cTn>
+                              </p:par>
+                              <p:par>
+                                <p:cTn id="32" presetID="10" presetClass="entr" presetSubtype="0" fill="hold" nodeType="withEffect">
+                                  <p:stCondLst>
+                                    <p:cond delay="0"/>
+                                  </p:stCondLst>
+                                  <p:childTnLst>
+                                    <p:set>
+                                      <p:cBhvr>
+                                        <p:cTn id="33" dur="1" fill="hold">
+                                          <p:stCondLst>
+                                            <p:cond delay="0"/>
+                                          </p:stCondLst>
+                                        </p:cTn>
+                                        <p:tgtEl>
+                                          <p:spTgt spid="7">
+                                            <p:txEl>
+                                              <p:pRg st="4" end="4"/>
+                                            </p:txEl>
+                                          </p:spTgt>
+                                        </p:tgtEl>
+                                        <p:attrNameLst>
+                                          <p:attrName>style.visibility</p:attrName>
+                                        </p:attrNameLst>
+                                      </p:cBhvr>
+                                      <p:to>
+                                        <p:strVal val="visible"/>
+                                      </p:to>
+                                    </p:set>
+                                    <p:animEffect transition="in" filter="fade">
+                                      <p:cBhvr>
+                                        <p:cTn id="34" dur="500"/>
+                                        <p:tgtEl>
+                                          <p:spTgt spid="7">
+                                            <p:txEl>
+                                              <p:pRg st="4" end="4"/>
+                                            </p:txEl>
+                                          </p:spTgt>
+                                        </p:tgtEl>
+                                      </p:cBhvr>
+                                    </p:animEffect>
+                                  </p:childTnLst>
+                                </p:cTn>
+                              </p:par>
+                            </p:childTnLst>
+                          </p:cTn>
+                        </p:par>
+                      </p:childTnLst>
+                    </p:cTn>
+                  </p:par>
+                  <p:par>
+                    <p:cTn id="35" fill="hold">
+                      <p:stCondLst>
+                        <p:cond delay="indefinite"/>
+                      </p:stCondLst>
+                      <p:childTnLst>
+                        <p:par>
+                          <p:cTn id="36" fill="hold">
+                            <p:stCondLst>
+                              <p:cond delay="0"/>
+                            </p:stCondLst>
+                            <p:childTnLst>
+                              <p:par>
+                                <p:cTn id="37" presetID="10" presetClass="entr" presetSubtype="0" fill="hold" nodeType="clickEffect">
+                                  <p:stCondLst>
+                                    <p:cond delay="0"/>
+                                  </p:stCondLst>
+                                  <p:childTnLst>
+                                    <p:set>
+                                      <p:cBhvr>
+                                        <p:cTn id="38" dur="1" fill="hold">
+                                          <p:stCondLst>
+                                            <p:cond delay="0"/>
+                                          </p:stCondLst>
+                                        </p:cTn>
+                                        <p:tgtEl>
+                                          <p:spTgt spid="26"/>
+                                        </p:tgtEl>
+                                        <p:attrNameLst>
+                                          <p:attrName>style.visibility</p:attrName>
+                                        </p:attrNameLst>
+                                      </p:cBhvr>
+                                      <p:to>
+                                        <p:strVal val="visible"/>
+                                      </p:to>
+                                    </p:set>
+                                    <p:animEffect transition="in" filter="fade">
+                                      <p:cBhvr>
+                                        <p:cTn id="39" dur="500"/>
+                                        <p:tgtEl>
+                                          <p:spTgt spid="26"/>
+                                        </p:tgtEl>
+                                      </p:cBhvr>
+                                    </p:animEffect>
+                                  </p:childTnLst>
+                                </p:cTn>
+                              </p:par>
+                            </p:childTnLst>
+                          </p:cTn>
+                        </p:par>
+                      </p:childTnLst>
+                    </p:cTn>
+                  </p:par>
+                </p:childTnLst>
+              </p:cTn>
+              <p:prevCondLst>
+                <p:cond evt="onPrev" delay="0">
+                  <p:tgtEl>
+                    <p:sldTgt/>
+                  </p:tgtEl>
+                </p:cond>
+              </p:prevCondLst>
+              <p:nextCondLst>
+                <p:cond evt="onNext" delay="0">
+                  <p:tgtEl>
+                    <p:sldTgt/>
+                  </p:tgtEl>
+                </p:cond>
+              </p:nextCondLst>
+            </p:seq>
+          </p:childTnLst>
+        </p:cTn>
+      </p:par>
+    </p:tnLst>
+    <p:bldLst>
+      <p:bldP spid="6" grpId="0" animBg="1"/>
+      <p:bldP spid="7" grpId="0" animBg="1"/>
+    </p:bldLst>
+  </p:timing>
+</p:sld>
+</file>
+
+<file path=ppt/slides/slide11.xml><?xml version="1.0" encoding="utf-8"?>
+<p:sld xmlns:a="http://schemas.openxmlformats.org/drawingml/2006/main" xmlns:r="http://schemas.openxmlformats.org/officeDocument/2006/relationships" xmlns:p="http://schemas.openxmlformats.org/presentationml/2006/main">
+  <p:cSld>
+    <p:spTree>
+      <p:nvGrpSpPr>
+        <p:cNvPr id="1" name=""/>
+        <p:cNvGrpSpPr/>
+        <p:nvPr/>
+      </p:nvGrpSpPr>
+      <p:grpSpPr>
+        <a:xfrm>
+          <a:off x="0" y="0"/>
+          <a:ext cx="0" cy="0"/>
+          <a:chOff x="0" y="0"/>
+          <a:chExt cx="0" cy="0"/>
+        </a:xfrm>
+      </p:grpSpPr>
       <p:sp>
         <p:nvSpPr>
           <p:cNvPr id="2" name="Title 1">
@@ -6008,7 +7303,7 @@
 </p:sld>
 </file>
 
-<file path=ppt/slides/slide11.xml><?xml version="1.0" encoding="utf-8"?>
+<file path=ppt/slides/slide12.xml><?xml version="1.0" encoding="utf-8"?>
 <p:sld xmlns:a="http://schemas.openxmlformats.org/drawingml/2006/main" xmlns:r="http://schemas.openxmlformats.org/officeDocument/2006/relationships" xmlns:p="http://schemas.openxmlformats.org/presentationml/2006/main">
   <p:cSld>
     <p:spTree>
@@ -6149,7 +7444,7 @@
 </p:sld>
 </file>
 
-<file path=ppt/slides/slide12.xml><?xml version="1.0" encoding="utf-8"?>
+<file path=ppt/slides/slide13.xml><?xml version="1.0" encoding="utf-8"?>
 <p:sld xmlns:a="http://schemas.openxmlformats.org/drawingml/2006/main" xmlns:r="http://schemas.openxmlformats.org/officeDocument/2006/relationships" xmlns:p="http://schemas.openxmlformats.org/presentationml/2006/main">
   <p:cSld>
     <p:spTree>
@@ -6308,7 +7603,7 @@
 </p:sld>
 </file>
 
-<file path=ppt/slides/slide13.xml><?xml version="1.0" encoding="utf-8"?>
+<file path=ppt/slides/slide14.xml><?xml version="1.0" encoding="utf-8"?>
 <p:sld xmlns:a="http://schemas.openxmlformats.org/drawingml/2006/main" xmlns:r="http://schemas.openxmlformats.org/officeDocument/2006/relationships" xmlns:p="http://schemas.openxmlformats.org/presentationml/2006/main">
   <p:cSld>
     <p:spTree>
@@ -6486,6 +7781,1266 @@
 </file>
 
 <file path=ppt/slides/slide2.xml><?xml version="1.0" encoding="utf-8"?>
+<p:sld xmlns:a="http://schemas.openxmlformats.org/drawingml/2006/main" xmlns:r="http://schemas.openxmlformats.org/officeDocument/2006/relationships" xmlns:p="http://schemas.openxmlformats.org/presentationml/2006/main">
+  <p:cSld>
+    <p:spTree>
+      <p:nvGrpSpPr>
+        <p:cNvPr id="1" name=""/>
+        <p:cNvGrpSpPr/>
+        <p:nvPr/>
+      </p:nvGrpSpPr>
+      <p:grpSpPr>
+        <a:xfrm>
+          <a:off x="0" y="0"/>
+          <a:ext cx="0" cy="0"/>
+          <a:chOff x="0" y="0"/>
+          <a:chExt cx="0" cy="0"/>
+        </a:xfrm>
+      </p:grpSpPr>
+      <p:sp>
+        <p:nvSpPr>
+          <p:cNvPr id="2" name="Title 1">
+            <a:extLst>
+              <a:ext uri="{FF2B5EF4-FFF2-40B4-BE49-F238E27FC236}">
+                <a16:creationId xmlns:a16="http://schemas.microsoft.com/office/drawing/2014/main" id="{DDDB1FD8-C8C7-4562-8CE9-949015807319}"/>
+              </a:ext>
+            </a:extLst>
+          </p:cNvPr>
+          <p:cNvSpPr>
+            <a:spLocks noGrp="1"/>
+          </p:cNvSpPr>
+          <p:nvPr>
+            <p:ph type="title"/>
+          </p:nvPr>
+        </p:nvSpPr>
+        <p:spPr>
+          <a:xfrm>
+            <a:off x="838200" y="365125"/>
+            <a:ext cx="10515600" cy="1325563"/>
+          </a:xfrm>
+        </p:spPr>
+        <p:txBody>
+          <a:bodyPr/>
+          <a:lstStyle/>
+          <a:p>
+            <a:r>
+              <a:rPr lang="pl-PL" dirty="0"/>
+              <a:t>Nasza aplikacja</a:t>
+            </a:r>
+          </a:p>
+        </p:txBody>
+      </p:sp>
+      <p:sp>
+        <p:nvSpPr>
+          <p:cNvPr id="4" name="Rectangle 3">
+            <a:extLst>
+              <a:ext uri="{FF2B5EF4-FFF2-40B4-BE49-F238E27FC236}">
+                <a16:creationId xmlns:a16="http://schemas.microsoft.com/office/drawing/2014/main" id="{C4344293-5681-4759-A983-9D1EC935E517}"/>
+              </a:ext>
+            </a:extLst>
+          </p:cNvPr>
+          <p:cNvSpPr/>
+          <p:nvPr/>
+        </p:nvSpPr>
+        <p:spPr>
+          <a:xfrm>
+            <a:off x="6318736" y="1690688"/>
+            <a:ext cx="2262554" cy="1172307"/>
+          </a:xfrm>
+          <a:prstGeom prst="rect">
+            <a:avLst/>
+          </a:prstGeom>
+          <a:ln/>
+        </p:spPr>
+        <p:style>
+          <a:lnRef idx="0">
+            <a:schemeClr val="accent1"/>
+          </a:lnRef>
+          <a:fillRef idx="3">
+            <a:schemeClr val="accent1"/>
+          </a:fillRef>
+          <a:effectRef idx="3">
+            <a:schemeClr val="accent1"/>
+          </a:effectRef>
+          <a:fontRef idx="minor">
+            <a:schemeClr val="lt1"/>
+          </a:fontRef>
+        </p:style>
+        <p:txBody>
+          <a:bodyPr rtlCol="0" anchor="ctr"/>
+          <a:lstStyle/>
+          <a:p>
+            <a:pPr algn="ctr"/>
+            <a:r>
+              <a:rPr lang="pl-PL" dirty="0"/>
+              <a:t>Witaj!</a:t>
+            </a:r>
+          </a:p>
+        </p:txBody>
+      </p:sp>
+      <p:sp>
+        <p:nvSpPr>
+          <p:cNvPr id="6" name="Rectangle 5">
+            <a:extLst>
+              <a:ext uri="{FF2B5EF4-FFF2-40B4-BE49-F238E27FC236}">
+                <a16:creationId xmlns:a16="http://schemas.microsoft.com/office/drawing/2014/main" id="{498D0918-AA01-4657-AD1F-49E4C6181BCB}"/>
+              </a:ext>
+            </a:extLst>
+          </p:cNvPr>
+          <p:cNvSpPr/>
+          <p:nvPr/>
+        </p:nvSpPr>
+        <p:spPr>
+          <a:xfrm>
+            <a:off x="6318736" y="3196554"/>
+            <a:ext cx="2262554" cy="1172307"/>
+          </a:xfrm>
+          <a:prstGeom prst="rect">
+            <a:avLst/>
+          </a:prstGeom>
+          <a:ln/>
+        </p:spPr>
+        <p:style>
+          <a:lnRef idx="0">
+            <a:schemeClr val="accent2"/>
+          </a:lnRef>
+          <a:fillRef idx="3">
+            <a:schemeClr val="accent2"/>
+          </a:fillRef>
+          <a:effectRef idx="3">
+            <a:schemeClr val="accent2"/>
+          </a:effectRef>
+          <a:fontRef idx="minor">
+            <a:schemeClr val="lt1"/>
+          </a:fontRef>
+        </p:style>
+        <p:txBody>
+          <a:bodyPr rtlCol="0" anchor="ctr"/>
+          <a:lstStyle/>
+          <a:p>
+            <a:pPr algn="ctr"/>
+            <a:r>
+              <a:rPr lang="pl-PL" dirty="0"/>
+              <a:t>Lista herosów</a:t>
+            </a:r>
+          </a:p>
+        </p:txBody>
+      </p:sp>
+      <p:sp>
+        <p:nvSpPr>
+          <p:cNvPr id="7" name="Rectangle 6">
+            <a:extLst>
+              <a:ext uri="{FF2B5EF4-FFF2-40B4-BE49-F238E27FC236}">
+                <a16:creationId xmlns:a16="http://schemas.microsoft.com/office/drawing/2014/main" id="{616947B4-48B3-4371-B28C-F67F6D890E70}"/>
+              </a:ext>
+            </a:extLst>
+          </p:cNvPr>
+          <p:cNvSpPr/>
+          <p:nvPr/>
+        </p:nvSpPr>
+        <p:spPr>
+          <a:xfrm>
+            <a:off x="6318736" y="4915722"/>
+            <a:ext cx="2262554" cy="1172307"/>
+          </a:xfrm>
+          <a:prstGeom prst="rect">
+            <a:avLst/>
+          </a:prstGeom>
+          <a:ln/>
+        </p:spPr>
+        <p:style>
+          <a:lnRef idx="0">
+            <a:schemeClr val="accent1"/>
+          </a:lnRef>
+          <a:fillRef idx="3">
+            <a:schemeClr val="accent1"/>
+          </a:fillRef>
+          <a:effectRef idx="3">
+            <a:schemeClr val="accent1"/>
+          </a:effectRef>
+          <a:fontRef idx="minor">
+            <a:schemeClr val="lt1"/>
+          </a:fontRef>
+        </p:style>
+        <p:txBody>
+          <a:bodyPr rtlCol="0" anchor="ctr"/>
+          <a:lstStyle/>
+          <a:p>
+            <a:pPr algn="ctr"/>
+            <a:r>
+              <a:rPr lang="pl-PL" dirty="0"/>
+              <a:t>Detale herosa</a:t>
+            </a:r>
+          </a:p>
+        </p:txBody>
+      </p:sp>
+      <p:sp>
+        <p:nvSpPr>
+          <p:cNvPr id="8" name="Rectangle 7">
+            <a:extLst>
+              <a:ext uri="{FF2B5EF4-FFF2-40B4-BE49-F238E27FC236}">
+                <a16:creationId xmlns:a16="http://schemas.microsoft.com/office/drawing/2014/main" id="{E700074F-4736-41D0-989D-E9353EFEA2A8}"/>
+              </a:ext>
+            </a:extLst>
+          </p:cNvPr>
+          <p:cNvSpPr/>
+          <p:nvPr/>
+        </p:nvSpPr>
+        <p:spPr>
+          <a:xfrm>
+            <a:off x="3542373" y="4525930"/>
+            <a:ext cx="2262554" cy="1172307"/>
+          </a:xfrm>
+          <a:prstGeom prst="rect">
+            <a:avLst/>
+          </a:prstGeom>
+          <a:ln/>
+        </p:spPr>
+        <p:style>
+          <a:lnRef idx="0">
+            <a:schemeClr val="accent1"/>
+          </a:lnRef>
+          <a:fillRef idx="3">
+            <a:schemeClr val="accent1"/>
+          </a:fillRef>
+          <a:effectRef idx="3">
+            <a:schemeClr val="accent1"/>
+          </a:effectRef>
+          <a:fontRef idx="minor">
+            <a:schemeClr val="lt1"/>
+          </a:fontRef>
+        </p:style>
+        <p:txBody>
+          <a:bodyPr rtlCol="0" anchor="ctr"/>
+          <a:lstStyle/>
+          <a:p>
+            <a:pPr algn="ctr"/>
+            <a:r>
+              <a:rPr lang="pl-PL" dirty="0"/>
+              <a:t>Siła (pięści)</a:t>
+            </a:r>
+          </a:p>
+        </p:txBody>
+      </p:sp>
+      <p:sp>
+        <p:nvSpPr>
+          <p:cNvPr id="9" name="Rectangle 8">
+            <a:extLst>
+              <a:ext uri="{FF2B5EF4-FFF2-40B4-BE49-F238E27FC236}">
+                <a16:creationId xmlns:a16="http://schemas.microsoft.com/office/drawing/2014/main" id="{09BA1F61-6190-4D33-9BB8-AA0E1EB687B5}"/>
+              </a:ext>
+            </a:extLst>
+          </p:cNvPr>
+          <p:cNvSpPr/>
+          <p:nvPr/>
+        </p:nvSpPr>
+        <p:spPr>
+          <a:xfrm>
+            <a:off x="3516921" y="3196553"/>
+            <a:ext cx="2262554" cy="1172307"/>
+          </a:xfrm>
+          <a:prstGeom prst="rect">
+            <a:avLst/>
+          </a:prstGeom>
+          <a:ln/>
+        </p:spPr>
+        <p:style>
+          <a:lnRef idx="0">
+            <a:schemeClr val="accent2"/>
+          </a:lnRef>
+          <a:fillRef idx="3">
+            <a:schemeClr val="accent2"/>
+          </a:fillRef>
+          <a:effectRef idx="3">
+            <a:schemeClr val="accent2"/>
+          </a:effectRef>
+          <a:fontRef idx="minor">
+            <a:schemeClr val="lt1"/>
+          </a:fontRef>
+        </p:style>
+        <p:txBody>
+          <a:bodyPr rtlCol="0" anchor="ctr"/>
+          <a:lstStyle/>
+          <a:p>
+            <a:pPr algn="ctr"/>
+            <a:r>
+              <a:rPr lang="pl-PL" dirty="0" err="1"/>
+              <a:t>App</a:t>
+            </a:r>
+            <a:endParaRPr lang="pl-PL" dirty="0"/>
+          </a:p>
+        </p:txBody>
+      </p:sp>
+      <p:sp>
+        <p:nvSpPr>
+          <p:cNvPr id="10" name="Rectangle 9">
+            <a:extLst>
+              <a:ext uri="{FF2B5EF4-FFF2-40B4-BE49-F238E27FC236}">
+                <a16:creationId xmlns:a16="http://schemas.microsoft.com/office/drawing/2014/main" id="{1F3E29E1-7C92-4BE9-B71F-DA15059AD5DD}"/>
+              </a:ext>
+            </a:extLst>
+          </p:cNvPr>
+          <p:cNvSpPr/>
+          <p:nvPr/>
+        </p:nvSpPr>
+        <p:spPr>
+          <a:xfrm>
+            <a:off x="838200" y="3196553"/>
+            <a:ext cx="2262554" cy="1172307"/>
+          </a:xfrm>
+          <a:prstGeom prst="rect">
+            <a:avLst/>
+          </a:prstGeom>
+        </p:spPr>
+        <p:style>
+          <a:lnRef idx="0">
+            <a:schemeClr val="accent6"/>
+          </a:lnRef>
+          <a:fillRef idx="3">
+            <a:schemeClr val="accent6"/>
+          </a:fillRef>
+          <a:effectRef idx="3">
+            <a:schemeClr val="accent6"/>
+          </a:effectRef>
+          <a:fontRef idx="minor">
+            <a:schemeClr val="lt1"/>
+          </a:fontRef>
+        </p:style>
+        <p:txBody>
+          <a:bodyPr rtlCol="0" anchor="ctr"/>
+          <a:lstStyle/>
+          <a:p>
+            <a:pPr algn="ctr"/>
+            <a:r>
+              <a:rPr lang="pl-PL" dirty="0"/>
+              <a:t>index.html</a:t>
+            </a:r>
+          </a:p>
+        </p:txBody>
+      </p:sp>
+      <p:sp>
+        <p:nvSpPr>
+          <p:cNvPr id="11" name="Arrow: Right 10">
+            <a:extLst>
+              <a:ext uri="{FF2B5EF4-FFF2-40B4-BE49-F238E27FC236}">
+                <a16:creationId xmlns:a16="http://schemas.microsoft.com/office/drawing/2014/main" id="{6B6D5395-AA06-4E80-B996-8A397169CD71}"/>
+              </a:ext>
+            </a:extLst>
+          </p:cNvPr>
+          <p:cNvSpPr/>
+          <p:nvPr/>
+        </p:nvSpPr>
+        <p:spPr>
+          <a:xfrm>
+            <a:off x="3112476" y="3636166"/>
+            <a:ext cx="392723" cy="293077"/>
+          </a:xfrm>
+          <a:prstGeom prst="rightArrow">
+            <a:avLst/>
+          </a:prstGeom>
+        </p:spPr>
+        <p:style>
+          <a:lnRef idx="0">
+            <a:schemeClr val="accent2"/>
+          </a:lnRef>
+          <a:fillRef idx="3">
+            <a:schemeClr val="accent2"/>
+          </a:fillRef>
+          <a:effectRef idx="3">
+            <a:schemeClr val="accent2"/>
+          </a:effectRef>
+          <a:fontRef idx="minor">
+            <a:schemeClr val="lt1"/>
+          </a:fontRef>
+        </p:style>
+        <p:txBody>
+          <a:bodyPr rtlCol="0" anchor="ctr"/>
+          <a:lstStyle/>
+          <a:p>
+            <a:pPr algn="ctr"/>
+            <a:endParaRPr lang="pl-PL"/>
+          </a:p>
+        </p:txBody>
+      </p:sp>
+      <p:sp>
+        <p:nvSpPr>
+          <p:cNvPr id="12" name="Arrow: Right 11">
+            <a:extLst>
+              <a:ext uri="{FF2B5EF4-FFF2-40B4-BE49-F238E27FC236}">
+                <a16:creationId xmlns:a16="http://schemas.microsoft.com/office/drawing/2014/main" id="{CF63B608-6484-421E-9B33-6DA40354556F}"/>
+              </a:ext>
+            </a:extLst>
+          </p:cNvPr>
+          <p:cNvSpPr/>
+          <p:nvPr/>
+        </p:nvSpPr>
+        <p:spPr>
+          <a:xfrm>
+            <a:off x="5858605" y="3636167"/>
+            <a:ext cx="392723" cy="293077"/>
+          </a:xfrm>
+          <a:prstGeom prst="rightArrow">
+            <a:avLst/>
+          </a:prstGeom>
+        </p:spPr>
+        <p:style>
+          <a:lnRef idx="0">
+            <a:schemeClr val="accent2"/>
+          </a:lnRef>
+          <a:fillRef idx="3">
+            <a:schemeClr val="accent2"/>
+          </a:fillRef>
+          <a:effectRef idx="3">
+            <a:schemeClr val="accent2"/>
+          </a:effectRef>
+          <a:fontRef idx="minor">
+            <a:schemeClr val="lt1"/>
+          </a:fontRef>
+        </p:style>
+        <p:txBody>
+          <a:bodyPr rtlCol="0" anchor="ctr"/>
+          <a:lstStyle/>
+          <a:p>
+            <a:pPr algn="ctr"/>
+            <a:endParaRPr lang="pl-PL"/>
+          </a:p>
+        </p:txBody>
+      </p:sp>
+      <p:sp>
+        <p:nvSpPr>
+          <p:cNvPr id="13" name="Arrow: Right 12">
+            <a:extLst>
+              <a:ext uri="{FF2B5EF4-FFF2-40B4-BE49-F238E27FC236}">
+                <a16:creationId xmlns:a16="http://schemas.microsoft.com/office/drawing/2014/main" id="{0AE81687-3ABA-4248-99FB-46B5827EE02B}"/>
+              </a:ext>
+            </a:extLst>
+          </p:cNvPr>
+          <p:cNvSpPr/>
+          <p:nvPr/>
+        </p:nvSpPr>
+        <p:spPr>
+          <a:xfrm rot="18891832">
+            <a:off x="5844823" y="2807466"/>
+            <a:ext cx="392723" cy="293077"/>
+          </a:xfrm>
+          <a:prstGeom prst="rightArrow">
+            <a:avLst/>
+          </a:prstGeom>
+        </p:spPr>
+        <p:style>
+          <a:lnRef idx="0">
+            <a:schemeClr val="accent1"/>
+          </a:lnRef>
+          <a:fillRef idx="3">
+            <a:schemeClr val="accent1"/>
+          </a:fillRef>
+          <a:effectRef idx="3">
+            <a:schemeClr val="accent1"/>
+          </a:effectRef>
+          <a:fontRef idx="minor">
+            <a:schemeClr val="lt1"/>
+          </a:fontRef>
+        </p:style>
+        <p:txBody>
+          <a:bodyPr rtlCol="0" anchor="ctr"/>
+          <a:lstStyle/>
+          <a:p>
+            <a:pPr algn="ctr"/>
+            <a:endParaRPr lang="pl-PL"/>
+          </a:p>
+        </p:txBody>
+      </p:sp>
+      <p:sp>
+        <p:nvSpPr>
+          <p:cNvPr id="14" name="Arrow: Right 13">
+            <a:extLst>
+              <a:ext uri="{FF2B5EF4-FFF2-40B4-BE49-F238E27FC236}">
+                <a16:creationId xmlns:a16="http://schemas.microsoft.com/office/drawing/2014/main" id="{8006FB83-C808-429D-81F1-05B54A6DAE9E}"/>
+              </a:ext>
+            </a:extLst>
+          </p:cNvPr>
+          <p:cNvSpPr/>
+          <p:nvPr/>
+        </p:nvSpPr>
+        <p:spPr>
+          <a:xfrm rot="5400000">
+            <a:off x="7253651" y="4495753"/>
+            <a:ext cx="392723" cy="293077"/>
+          </a:xfrm>
+          <a:prstGeom prst="rightArrow">
+            <a:avLst/>
+          </a:prstGeom>
+        </p:spPr>
+        <p:style>
+          <a:lnRef idx="0">
+            <a:schemeClr val="accent1"/>
+          </a:lnRef>
+          <a:fillRef idx="3">
+            <a:schemeClr val="accent1"/>
+          </a:fillRef>
+          <a:effectRef idx="3">
+            <a:schemeClr val="accent1"/>
+          </a:effectRef>
+          <a:fontRef idx="minor">
+            <a:schemeClr val="lt1"/>
+          </a:fontRef>
+        </p:style>
+        <p:txBody>
+          <a:bodyPr rtlCol="0" anchor="ctr"/>
+          <a:lstStyle/>
+          <a:p>
+            <a:pPr algn="ctr"/>
+            <a:endParaRPr lang="pl-PL"/>
+          </a:p>
+        </p:txBody>
+      </p:sp>
+      <p:sp>
+        <p:nvSpPr>
+          <p:cNvPr id="15" name="Arrow: Right 14">
+            <a:extLst>
+              <a:ext uri="{FF2B5EF4-FFF2-40B4-BE49-F238E27FC236}">
+                <a16:creationId xmlns:a16="http://schemas.microsoft.com/office/drawing/2014/main" id="{F41F27AF-696F-49B7-853A-68DC4D5FA013}"/>
+              </a:ext>
+            </a:extLst>
+          </p:cNvPr>
+          <p:cNvSpPr/>
+          <p:nvPr/>
+        </p:nvSpPr>
+        <p:spPr>
+          <a:xfrm rot="2671920">
+            <a:off x="8662843" y="4137220"/>
+            <a:ext cx="392723" cy="293077"/>
+          </a:xfrm>
+          <a:prstGeom prst="rightArrow">
+            <a:avLst/>
+          </a:prstGeom>
+        </p:spPr>
+        <p:style>
+          <a:lnRef idx="0">
+            <a:schemeClr val="accent4"/>
+          </a:lnRef>
+          <a:fillRef idx="3">
+            <a:schemeClr val="accent4"/>
+          </a:fillRef>
+          <a:effectRef idx="3">
+            <a:schemeClr val="accent4"/>
+          </a:effectRef>
+          <a:fontRef idx="minor">
+            <a:schemeClr val="lt1"/>
+          </a:fontRef>
+        </p:style>
+        <p:txBody>
+          <a:bodyPr rtlCol="0" anchor="ctr"/>
+          <a:lstStyle/>
+          <a:p>
+            <a:pPr algn="ctr"/>
+            <a:endParaRPr lang="pl-PL"/>
+          </a:p>
+        </p:txBody>
+      </p:sp>
+      <p:sp>
+        <p:nvSpPr>
+          <p:cNvPr id="16" name="Arrow: Right 15">
+            <a:extLst>
+              <a:ext uri="{FF2B5EF4-FFF2-40B4-BE49-F238E27FC236}">
+                <a16:creationId xmlns:a16="http://schemas.microsoft.com/office/drawing/2014/main" id="{4677FA41-F82C-497C-BF1A-938E51E3F0C0}"/>
+              </a:ext>
+            </a:extLst>
+          </p:cNvPr>
+          <p:cNvSpPr/>
+          <p:nvPr/>
+        </p:nvSpPr>
+        <p:spPr>
+          <a:xfrm rot="19018893">
+            <a:off x="8671349" y="4914120"/>
+            <a:ext cx="392723" cy="293077"/>
+          </a:xfrm>
+          <a:prstGeom prst="rightArrow">
+            <a:avLst/>
+          </a:prstGeom>
+        </p:spPr>
+        <p:style>
+          <a:lnRef idx="0">
+            <a:schemeClr val="accent4"/>
+          </a:lnRef>
+          <a:fillRef idx="3">
+            <a:schemeClr val="accent4"/>
+          </a:fillRef>
+          <a:effectRef idx="3">
+            <a:schemeClr val="accent4"/>
+          </a:effectRef>
+          <a:fontRef idx="minor">
+            <a:schemeClr val="lt1"/>
+          </a:fontRef>
+        </p:style>
+        <p:txBody>
+          <a:bodyPr rtlCol="0" anchor="ctr"/>
+          <a:lstStyle/>
+          <a:p>
+            <a:pPr algn="ctr"/>
+            <a:endParaRPr lang="pl-PL"/>
+          </a:p>
+        </p:txBody>
+      </p:sp>
+      <p:sp>
+        <p:nvSpPr>
+          <p:cNvPr id="18" name="Rectangle 17">
+            <a:extLst>
+              <a:ext uri="{FF2B5EF4-FFF2-40B4-BE49-F238E27FC236}">
+                <a16:creationId xmlns:a16="http://schemas.microsoft.com/office/drawing/2014/main" id="{F500937E-CA9B-493A-A726-41B14AAF01A8}"/>
+              </a:ext>
+            </a:extLst>
+          </p:cNvPr>
+          <p:cNvSpPr/>
+          <p:nvPr/>
+        </p:nvSpPr>
+        <p:spPr>
+          <a:xfrm>
+            <a:off x="9155718" y="4056137"/>
+            <a:ext cx="2262554" cy="1172307"/>
+          </a:xfrm>
+          <a:prstGeom prst="rect">
+            <a:avLst/>
+          </a:prstGeom>
+          <a:ln/>
+        </p:spPr>
+        <p:style>
+          <a:lnRef idx="0">
+            <a:schemeClr val="accent4"/>
+          </a:lnRef>
+          <a:fillRef idx="3">
+            <a:schemeClr val="accent4"/>
+          </a:fillRef>
+          <a:effectRef idx="3">
+            <a:schemeClr val="accent4"/>
+          </a:effectRef>
+          <a:fontRef idx="minor">
+            <a:schemeClr val="lt1"/>
+          </a:fontRef>
+        </p:style>
+        <p:txBody>
+          <a:bodyPr rtlCol="0" anchor="ctr"/>
+          <a:lstStyle/>
+          <a:p>
+            <a:pPr algn="ctr"/>
+            <a:r>
+              <a:rPr lang="pl-PL" dirty="0"/>
+              <a:t>Edycja herosa</a:t>
+            </a:r>
+          </a:p>
+        </p:txBody>
+      </p:sp>
+      <p:sp>
+        <p:nvSpPr>
+          <p:cNvPr id="19" name="Arrow: Right 18">
+            <a:extLst>
+              <a:ext uri="{FF2B5EF4-FFF2-40B4-BE49-F238E27FC236}">
+                <a16:creationId xmlns:a16="http://schemas.microsoft.com/office/drawing/2014/main" id="{E878AC32-F105-41A6-A728-538CC3DAE1B6}"/>
+              </a:ext>
+            </a:extLst>
+          </p:cNvPr>
+          <p:cNvSpPr/>
+          <p:nvPr/>
+        </p:nvSpPr>
+        <p:spPr>
+          <a:xfrm rot="8248652">
+            <a:off x="5894422" y="4457282"/>
+            <a:ext cx="392723" cy="293077"/>
+          </a:xfrm>
+          <a:prstGeom prst="rightArrow">
+            <a:avLst/>
+          </a:prstGeom>
+        </p:spPr>
+        <p:style>
+          <a:lnRef idx="0">
+            <a:schemeClr val="accent1"/>
+          </a:lnRef>
+          <a:fillRef idx="3">
+            <a:schemeClr val="accent1"/>
+          </a:fillRef>
+          <a:effectRef idx="3">
+            <a:schemeClr val="accent1"/>
+          </a:effectRef>
+          <a:fontRef idx="minor">
+            <a:schemeClr val="lt1"/>
+          </a:fontRef>
+        </p:style>
+        <p:txBody>
+          <a:bodyPr rtlCol="0" anchor="ctr"/>
+          <a:lstStyle/>
+          <a:p>
+            <a:pPr algn="ctr"/>
+            <a:endParaRPr lang="pl-PL"/>
+          </a:p>
+        </p:txBody>
+      </p:sp>
+      <p:sp>
+        <p:nvSpPr>
+          <p:cNvPr id="20" name="Arrow: Right 19">
+            <a:extLst>
+              <a:ext uri="{FF2B5EF4-FFF2-40B4-BE49-F238E27FC236}">
+                <a16:creationId xmlns:a16="http://schemas.microsoft.com/office/drawing/2014/main" id="{8F58B16D-D1A1-4FEB-AEFA-DA6A6A360F06}"/>
+              </a:ext>
+            </a:extLst>
+          </p:cNvPr>
+          <p:cNvSpPr/>
+          <p:nvPr/>
+        </p:nvSpPr>
+        <p:spPr>
+          <a:xfrm rot="13752821">
+            <a:off x="5886665" y="5307298"/>
+            <a:ext cx="392723" cy="293077"/>
+          </a:xfrm>
+          <a:prstGeom prst="rightArrow">
+            <a:avLst/>
+          </a:prstGeom>
+        </p:spPr>
+        <p:style>
+          <a:lnRef idx="0">
+            <a:schemeClr val="accent1"/>
+          </a:lnRef>
+          <a:fillRef idx="3">
+            <a:schemeClr val="accent1"/>
+          </a:fillRef>
+          <a:effectRef idx="3">
+            <a:schemeClr val="accent1"/>
+          </a:effectRef>
+          <a:fontRef idx="minor">
+            <a:schemeClr val="lt1"/>
+          </a:fontRef>
+        </p:style>
+        <p:txBody>
+          <a:bodyPr rtlCol="0" anchor="ctr"/>
+          <a:lstStyle/>
+          <a:p>
+            <a:pPr algn="ctr"/>
+            <a:endParaRPr lang="pl-PL"/>
+          </a:p>
+        </p:txBody>
+      </p:sp>
+    </p:spTree>
+    <p:extLst>
+      <p:ext uri="{BB962C8B-B14F-4D97-AF65-F5344CB8AC3E}">
+        <p14:creationId xmlns:p14="http://schemas.microsoft.com/office/powerpoint/2010/main" val="1687622844"/>
+      </p:ext>
+    </p:extLst>
+  </p:cSld>
+  <p:clrMapOvr>
+    <a:masterClrMapping/>
+  </p:clrMapOvr>
+  <p:timing>
+    <p:tnLst>
+      <p:par>
+        <p:cTn id="1" dur="indefinite" restart="never" nodeType="tmRoot">
+          <p:childTnLst>
+            <p:seq concurrent="1" nextAc="seek">
+              <p:cTn id="2" dur="indefinite" nodeType="mainSeq">
+                <p:childTnLst>
+                  <p:par>
+                    <p:cTn id="3" fill="hold">
+                      <p:stCondLst>
+                        <p:cond delay="indefinite"/>
+                      </p:stCondLst>
+                      <p:childTnLst>
+                        <p:par>
+                          <p:cTn id="4" fill="hold">
+                            <p:stCondLst>
+                              <p:cond delay="0"/>
+                            </p:stCondLst>
+                            <p:childTnLst>
+                              <p:par>
+                                <p:cTn id="5" presetID="10" presetClass="entr" presetSubtype="0" fill="hold" grpId="0" nodeType="clickEffect">
+                                  <p:stCondLst>
+                                    <p:cond delay="0"/>
+                                  </p:stCondLst>
+                                  <p:childTnLst>
+                                    <p:set>
+                                      <p:cBhvr>
+                                        <p:cTn id="6" dur="1" fill="hold">
+                                          <p:stCondLst>
+                                            <p:cond delay="0"/>
+                                          </p:stCondLst>
+                                        </p:cTn>
+                                        <p:tgtEl>
+                                          <p:spTgt spid="19"/>
+                                        </p:tgtEl>
+                                        <p:attrNameLst>
+                                          <p:attrName>style.visibility</p:attrName>
+                                        </p:attrNameLst>
+                                      </p:cBhvr>
+                                      <p:to>
+                                        <p:strVal val="visible"/>
+                                      </p:to>
+                                    </p:set>
+                                    <p:animEffect transition="in" filter="fade">
+                                      <p:cBhvr>
+                                        <p:cTn id="7" dur="500"/>
+                                        <p:tgtEl>
+                                          <p:spTgt spid="19"/>
+                                        </p:tgtEl>
+                                      </p:cBhvr>
+                                    </p:animEffect>
+                                  </p:childTnLst>
+                                </p:cTn>
+                              </p:par>
+                            </p:childTnLst>
+                          </p:cTn>
+                        </p:par>
+                        <p:par>
+                          <p:cTn id="8" fill="hold">
+                            <p:stCondLst>
+                              <p:cond delay="500"/>
+                            </p:stCondLst>
+                            <p:childTnLst>
+                              <p:par>
+                                <p:cTn id="9" presetID="10" presetClass="entr" presetSubtype="0" fill="hold" grpId="0" nodeType="afterEffect">
+                                  <p:stCondLst>
+                                    <p:cond delay="0"/>
+                                  </p:stCondLst>
+                                  <p:childTnLst>
+                                    <p:set>
+                                      <p:cBhvr>
+                                        <p:cTn id="10" dur="1" fill="hold">
+                                          <p:stCondLst>
+                                            <p:cond delay="0"/>
+                                          </p:stCondLst>
+                                        </p:cTn>
+                                        <p:tgtEl>
+                                          <p:spTgt spid="8"/>
+                                        </p:tgtEl>
+                                        <p:attrNameLst>
+                                          <p:attrName>style.visibility</p:attrName>
+                                        </p:attrNameLst>
+                                      </p:cBhvr>
+                                      <p:to>
+                                        <p:strVal val="visible"/>
+                                      </p:to>
+                                    </p:set>
+                                    <p:animEffect transition="in" filter="fade">
+                                      <p:cBhvr>
+                                        <p:cTn id="11" dur="500"/>
+                                        <p:tgtEl>
+                                          <p:spTgt spid="8"/>
+                                        </p:tgtEl>
+                                      </p:cBhvr>
+                                    </p:animEffect>
+                                  </p:childTnLst>
+                                </p:cTn>
+                              </p:par>
+                            </p:childTnLst>
+                          </p:cTn>
+                        </p:par>
+                      </p:childTnLst>
+                    </p:cTn>
+                  </p:par>
+                  <p:par>
+                    <p:cTn id="12" fill="hold">
+                      <p:stCondLst>
+                        <p:cond delay="indefinite"/>
+                      </p:stCondLst>
+                      <p:childTnLst>
+                        <p:par>
+                          <p:cTn id="13" fill="hold">
+                            <p:stCondLst>
+                              <p:cond delay="0"/>
+                            </p:stCondLst>
+                            <p:childTnLst>
+                              <p:par>
+                                <p:cTn id="14" presetID="10" presetClass="entr" presetSubtype="0" fill="hold" grpId="0" nodeType="clickEffect">
+                                  <p:stCondLst>
+                                    <p:cond delay="0"/>
+                                  </p:stCondLst>
+                                  <p:childTnLst>
+                                    <p:set>
+                                      <p:cBhvr>
+                                        <p:cTn id="15" dur="1" fill="hold">
+                                          <p:stCondLst>
+                                            <p:cond delay="0"/>
+                                          </p:stCondLst>
+                                        </p:cTn>
+                                        <p:tgtEl>
+                                          <p:spTgt spid="13"/>
+                                        </p:tgtEl>
+                                        <p:attrNameLst>
+                                          <p:attrName>style.visibility</p:attrName>
+                                        </p:attrNameLst>
+                                      </p:cBhvr>
+                                      <p:to>
+                                        <p:strVal val="visible"/>
+                                      </p:to>
+                                    </p:set>
+                                    <p:animEffect transition="in" filter="fade">
+                                      <p:cBhvr>
+                                        <p:cTn id="16" dur="500"/>
+                                        <p:tgtEl>
+                                          <p:spTgt spid="13"/>
+                                        </p:tgtEl>
+                                      </p:cBhvr>
+                                    </p:animEffect>
+                                  </p:childTnLst>
+                                </p:cTn>
+                              </p:par>
+                            </p:childTnLst>
+                          </p:cTn>
+                        </p:par>
+                        <p:par>
+                          <p:cTn id="17" fill="hold">
+                            <p:stCondLst>
+                              <p:cond delay="500"/>
+                            </p:stCondLst>
+                            <p:childTnLst>
+                              <p:par>
+                                <p:cTn id="18" presetID="10" presetClass="entr" presetSubtype="0" fill="hold" grpId="0" nodeType="afterEffect">
+                                  <p:stCondLst>
+                                    <p:cond delay="0"/>
+                                  </p:stCondLst>
+                                  <p:childTnLst>
+                                    <p:set>
+                                      <p:cBhvr>
+                                        <p:cTn id="19" dur="1" fill="hold">
+                                          <p:stCondLst>
+                                            <p:cond delay="0"/>
+                                          </p:stCondLst>
+                                        </p:cTn>
+                                        <p:tgtEl>
+                                          <p:spTgt spid="4"/>
+                                        </p:tgtEl>
+                                        <p:attrNameLst>
+                                          <p:attrName>style.visibility</p:attrName>
+                                        </p:attrNameLst>
+                                      </p:cBhvr>
+                                      <p:to>
+                                        <p:strVal val="visible"/>
+                                      </p:to>
+                                    </p:set>
+                                    <p:animEffect transition="in" filter="fade">
+                                      <p:cBhvr>
+                                        <p:cTn id="20" dur="500"/>
+                                        <p:tgtEl>
+                                          <p:spTgt spid="4"/>
+                                        </p:tgtEl>
+                                      </p:cBhvr>
+                                    </p:animEffect>
+                                  </p:childTnLst>
+                                </p:cTn>
+                              </p:par>
+                            </p:childTnLst>
+                          </p:cTn>
+                        </p:par>
+                      </p:childTnLst>
+                    </p:cTn>
+                  </p:par>
+                  <p:par>
+                    <p:cTn id="21" fill="hold">
+                      <p:stCondLst>
+                        <p:cond delay="indefinite"/>
+                      </p:stCondLst>
+                      <p:childTnLst>
+                        <p:par>
+                          <p:cTn id="22" fill="hold">
+                            <p:stCondLst>
+                              <p:cond delay="0"/>
+                            </p:stCondLst>
+                            <p:childTnLst>
+                              <p:par>
+                                <p:cTn id="23" presetID="10" presetClass="entr" presetSubtype="0" fill="hold" grpId="0" nodeType="clickEffect">
+                                  <p:stCondLst>
+                                    <p:cond delay="0"/>
+                                  </p:stCondLst>
+                                  <p:childTnLst>
+                                    <p:set>
+                                      <p:cBhvr>
+                                        <p:cTn id="24" dur="1" fill="hold">
+                                          <p:stCondLst>
+                                            <p:cond delay="0"/>
+                                          </p:stCondLst>
+                                        </p:cTn>
+                                        <p:tgtEl>
+                                          <p:spTgt spid="14"/>
+                                        </p:tgtEl>
+                                        <p:attrNameLst>
+                                          <p:attrName>style.visibility</p:attrName>
+                                        </p:attrNameLst>
+                                      </p:cBhvr>
+                                      <p:to>
+                                        <p:strVal val="visible"/>
+                                      </p:to>
+                                    </p:set>
+                                    <p:animEffect transition="in" filter="fade">
+                                      <p:cBhvr>
+                                        <p:cTn id="25" dur="500"/>
+                                        <p:tgtEl>
+                                          <p:spTgt spid="14"/>
+                                        </p:tgtEl>
+                                      </p:cBhvr>
+                                    </p:animEffect>
+                                  </p:childTnLst>
+                                </p:cTn>
+                              </p:par>
+                            </p:childTnLst>
+                          </p:cTn>
+                        </p:par>
+                        <p:par>
+                          <p:cTn id="26" fill="hold">
+                            <p:stCondLst>
+                              <p:cond delay="500"/>
+                            </p:stCondLst>
+                            <p:childTnLst>
+                              <p:par>
+                                <p:cTn id="27" presetID="10" presetClass="entr" presetSubtype="0" fill="hold" grpId="0" nodeType="afterEffect">
+                                  <p:stCondLst>
+                                    <p:cond delay="0"/>
+                                  </p:stCondLst>
+                                  <p:childTnLst>
+                                    <p:set>
+                                      <p:cBhvr>
+                                        <p:cTn id="28" dur="1" fill="hold">
+                                          <p:stCondLst>
+                                            <p:cond delay="0"/>
+                                          </p:stCondLst>
+                                        </p:cTn>
+                                        <p:tgtEl>
+                                          <p:spTgt spid="7"/>
+                                        </p:tgtEl>
+                                        <p:attrNameLst>
+                                          <p:attrName>style.visibility</p:attrName>
+                                        </p:attrNameLst>
+                                      </p:cBhvr>
+                                      <p:to>
+                                        <p:strVal val="visible"/>
+                                      </p:to>
+                                    </p:set>
+                                    <p:animEffect transition="in" filter="fade">
+                                      <p:cBhvr>
+                                        <p:cTn id="29" dur="500"/>
+                                        <p:tgtEl>
+                                          <p:spTgt spid="7"/>
+                                        </p:tgtEl>
+                                      </p:cBhvr>
+                                    </p:animEffect>
+                                  </p:childTnLst>
+                                </p:cTn>
+                              </p:par>
+                            </p:childTnLst>
+                          </p:cTn>
+                        </p:par>
+                      </p:childTnLst>
+                    </p:cTn>
+                  </p:par>
+                  <p:par>
+                    <p:cTn id="30" fill="hold">
+                      <p:stCondLst>
+                        <p:cond delay="indefinite"/>
+                      </p:stCondLst>
+                      <p:childTnLst>
+                        <p:par>
+                          <p:cTn id="31" fill="hold">
+                            <p:stCondLst>
+                              <p:cond delay="0"/>
+                            </p:stCondLst>
+                            <p:childTnLst>
+                              <p:par>
+                                <p:cTn id="32" presetID="10" presetClass="entr" presetSubtype="0" fill="hold" grpId="0" nodeType="clickEffect">
+                                  <p:stCondLst>
+                                    <p:cond delay="0"/>
+                                  </p:stCondLst>
+                                  <p:childTnLst>
+                                    <p:set>
+                                      <p:cBhvr>
+                                        <p:cTn id="33" dur="1" fill="hold">
+                                          <p:stCondLst>
+                                            <p:cond delay="0"/>
+                                          </p:stCondLst>
+                                        </p:cTn>
+                                        <p:tgtEl>
+                                          <p:spTgt spid="20"/>
+                                        </p:tgtEl>
+                                        <p:attrNameLst>
+                                          <p:attrName>style.visibility</p:attrName>
+                                        </p:attrNameLst>
+                                      </p:cBhvr>
+                                      <p:to>
+                                        <p:strVal val="visible"/>
+                                      </p:to>
+                                    </p:set>
+                                    <p:animEffect transition="in" filter="fade">
+                                      <p:cBhvr>
+                                        <p:cTn id="34" dur="500"/>
+                                        <p:tgtEl>
+                                          <p:spTgt spid="20"/>
+                                        </p:tgtEl>
+                                      </p:cBhvr>
+                                    </p:animEffect>
+                                  </p:childTnLst>
+                                </p:cTn>
+                              </p:par>
+                            </p:childTnLst>
+                          </p:cTn>
+                        </p:par>
+                      </p:childTnLst>
+                    </p:cTn>
+                  </p:par>
+                  <p:par>
+                    <p:cTn id="35" fill="hold">
+                      <p:stCondLst>
+                        <p:cond delay="indefinite"/>
+                      </p:stCondLst>
+                      <p:childTnLst>
+                        <p:par>
+                          <p:cTn id="36" fill="hold">
+                            <p:stCondLst>
+                              <p:cond delay="0"/>
+                            </p:stCondLst>
+                            <p:childTnLst>
+                              <p:par>
+                                <p:cTn id="37" presetID="10" presetClass="entr" presetSubtype="0" fill="hold" grpId="0" nodeType="clickEffect">
+                                  <p:stCondLst>
+                                    <p:cond delay="0"/>
+                                  </p:stCondLst>
+                                  <p:childTnLst>
+                                    <p:set>
+                                      <p:cBhvr>
+                                        <p:cTn id="38" dur="1" fill="hold">
+                                          <p:stCondLst>
+                                            <p:cond delay="0"/>
+                                          </p:stCondLst>
+                                        </p:cTn>
+                                        <p:tgtEl>
+                                          <p:spTgt spid="15"/>
+                                        </p:tgtEl>
+                                        <p:attrNameLst>
+                                          <p:attrName>style.visibility</p:attrName>
+                                        </p:attrNameLst>
+                                      </p:cBhvr>
+                                      <p:to>
+                                        <p:strVal val="visible"/>
+                                      </p:to>
+                                    </p:set>
+                                    <p:animEffect transition="in" filter="fade">
+                                      <p:cBhvr>
+                                        <p:cTn id="39" dur="500"/>
+                                        <p:tgtEl>
+                                          <p:spTgt spid="15"/>
+                                        </p:tgtEl>
+                                      </p:cBhvr>
+                                    </p:animEffect>
+                                  </p:childTnLst>
+                                </p:cTn>
+                              </p:par>
+                              <p:par>
+                                <p:cTn id="40" presetID="10" presetClass="entr" presetSubtype="0" fill="hold" grpId="0" nodeType="withEffect">
+                                  <p:stCondLst>
+                                    <p:cond delay="0"/>
+                                  </p:stCondLst>
+                                  <p:childTnLst>
+                                    <p:set>
+                                      <p:cBhvr>
+                                        <p:cTn id="41" dur="1" fill="hold">
+                                          <p:stCondLst>
+                                            <p:cond delay="0"/>
+                                          </p:stCondLst>
+                                        </p:cTn>
+                                        <p:tgtEl>
+                                          <p:spTgt spid="16"/>
+                                        </p:tgtEl>
+                                        <p:attrNameLst>
+                                          <p:attrName>style.visibility</p:attrName>
+                                        </p:attrNameLst>
+                                      </p:cBhvr>
+                                      <p:to>
+                                        <p:strVal val="visible"/>
+                                      </p:to>
+                                    </p:set>
+                                    <p:animEffect transition="in" filter="fade">
+                                      <p:cBhvr>
+                                        <p:cTn id="42" dur="500"/>
+                                        <p:tgtEl>
+                                          <p:spTgt spid="16"/>
+                                        </p:tgtEl>
+                                      </p:cBhvr>
+                                    </p:animEffect>
+                                  </p:childTnLst>
+                                </p:cTn>
+                              </p:par>
+                              <p:par>
+                                <p:cTn id="43" presetID="10" presetClass="entr" presetSubtype="0" fill="hold" grpId="0" nodeType="withEffect">
+                                  <p:stCondLst>
+                                    <p:cond delay="0"/>
+                                  </p:stCondLst>
+                                  <p:childTnLst>
+                                    <p:set>
+                                      <p:cBhvr>
+                                        <p:cTn id="44" dur="1" fill="hold">
+                                          <p:stCondLst>
+                                            <p:cond delay="0"/>
+                                          </p:stCondLst>
+                                        </p:cTn>
+                                        <p:tgtEl>
+                                          <p:spTgt spid="18"/>
+                                        </p:tgtEl>
+                                        <p:attrNameLst>
+                                          <p:attrName>style.visibility</p:attrName>
+                                        </p:attrNameLst>
+                                      </p:cBhvr>
+                                      <p:to>
+                                        <p:strVal val="visible"/>
+                                      </p:to>
+                                    </p:set>
+                                    <p:animEffect transition="in" filter="fade">
+                                      <p:cBhvr>
+                                        <p:cTn id="45" dur="500"/>
+                                        <p:tgtEl>
+                                          <p:spTgt spid="18"/>
+                                        </p:tgtEl>
+                                      </p:cBhvr>
+                                    </p:animEffect>
+                                  </p:childTnLst>
+                                </p:cTn>
+                              </p:par>
+                            </p:childTnLst>
+                          </p:cTn>
+                        </p:par>
+                      </p:childTnLst>
+                    </p:cTn>
+                  </p:par>
+                </p:childTnLst>
+              </p:cTn>
+              <p:prevCondLst>
+                <p:cond evt="onPrev" delay="0">
+                  <p:tgtEl>
+                    <p:sldTgt/>
+                  </p:tgtEl>
+                </p:cond>
+              </p:prevCondLst>
+              <p:nextCondLst>
+                <p:cond evt="onNext" delay="0">
+                  <p:tgtEl>
+                    <p:sldTgt/>
+                  </p:tgtEl>
+                </p:cond>
+              </p:nextCondLst>
+            </p:seq>
+          </p:childTnLst>
+        </p:cTn>
+      </p:par>
+    </p:tnLst>
+    <p:bldLst>
+      <p:bldP spid="4" grpId="0" animBg="1"/>
+      <p:bldP spid="7" grpId="0" animBg="1"/>
+      <p:bldP spid="8" grpId="0" animBg="1"/>
+      <p:bldP spid="13" grpId="0" animBg="1"/>
+      <p:bldP spid="14" grpId="0" animBg="1"/>
+      <p:bldP spid="15" grpId="0" animBg="1"/>
+      <p:bldP spid="16" grpId="0" animBg="1"/>
+      <p:bldP spid="18" grpId="0" animBg="1"/>
+      <p:bldP spid="19" grpId="0" animBg="1"/>
+      <p:bldP spid="20" grpId="0" animBg="1"/>
+    </p:bldLst>
+  </p:timing>
+</p:sld>
+</file>
+
+<file path=ppt/slides/slide3.xml><?xml version="1.0" encoding="utf-8"?>
 <p:sld xmlns:a="http://schemas.openxmlformats.org/drawingml/2006/main" xmlns:r="http://schemas.openxmlformats.org/officeDocument/2006/relationships" xmlns:p="http://schemas.openxmlformats.org/presentationml/2006/main">
   <p:cSld>
     <p:spTree>
@@ -7572,7 +10127,7 @@
 </p:sld>
 </file>
 
-<file path=ppt/slides/slide3.xml><?xml version="1.0" encoding="utf-8"?>
+<file path=ppt/slides/slide4.xml><?xml version="1.0" encoding="utf-8"?>
 <p:sld xmlns:a="http://schemas.openxmlformats.org/drawingml/2006/main" xmlns:r="http://schemas.openxmlformats.org/officeDocument/2006/relationships" xmlns:p="http://schemas.openxmlformats.org/presentationml/2006/main">
   <p:cSld>
     <p:spTree>
@@ -8537,7 +11092,7 @@
 </p:sld>
 </file>
 
-<file path=ppt/slides/slide4.xml><?xml version="1.0" encoding="utf-8"?>
+<file path=ppt/slides/slide5.xml><?xml version="1.0" encoding="utf-8"?>
 <p:sld xmlns:a="http://schemas.openxmlformats.org/drawingml/2006/main" xmlns:r="http://schemas.openxmlformats.org/officeDocument/2006/relationships" xmlns:p="http://schemas.openxmlformats.org/presentationml/2006/main">
   <p:cSld>
     <p:spTree>
@@ -9675,7 +12230,7 @@
 </p:sld>
 </file>
 
-<file path=ppt/slides/slide5.xml><?xml version="1.0" encoding="utf-8"?>
+<file path=ppt/slides/slide6.xml><?xml version="1.0" encoding="utf-8"?>
 <p:sld xmlns:a="http://schemas.openxmlformats.org/drawingml/2006/main" xmlns:r="http://schemas.openxmlformats.org/officeDocument/2006/relationships" xmlns:p="http://schemas.openxmlformats.org/presentationml/2006/main">
   <p:cSld>
     <p:spTree>
@@ -10072,7 +12627,7 @@
 </p:sld>
 </file>
 
-<file path=ppt/slides/slide6.xml><?xml version="1.0" encoding="utf-8"?>
+<file path=ppt/slides/slide7.xml><?xml version="1.0" encoding="utf-8"?>
 <p:sld xmlns:a="http://schemas.openxmlformats.org/drawingml/2006/main" xmlns:r="http://schemas.openxmlformats.org/officeDocument/2006/relationships" xmlns:p="http://schemas.openxmlformats.org/presentationml/2006/main">
   <p:cSld>
     <p:spTree>
@@ -10549,7 +13104,7 @@
 </p:sld>
 </file>
 
-<file path=ppt/slides/slide7.xml><?xml version="1.0" encoding="utf-8"?>
+<file path=ppt/slides/slide8.xml><?xml version="1.0" encoding="utf-8"?>
 <p:sld xmlns:a="http://schemas.openxmlformats.org/drawingml/2006/main" xmlns:r="http://schemas.openxmlformats.org/officeDocument/2006/relationships" xmlns:p="http://schemas.openxmlformats.org/presentationml/2006/main">
   <p:cSld>
     <p:spTree>
@@ -11553,7 +14108,7 @@
 </p:sld>
 </file>
 
-<file path=ppt/slides/slide8.xml><?xml version="1.0" encoding="utf-8"?>
+<file path=ppt/slides/slide9.xml><?xml version="1.0" encoding="utf-8"?>
 <p:sld xmlns:a="http://schemas.openxmlformats.org/drawingml/2006/main" xmlns:r="http://schemas.openxmlformats.org/officeDocument/2006/relationships" xmlns:p="http://schemas.openxmlformats.org/presentationml/2006/main">
   <p:cSld>
     <p:spTree>
@@ -14296,1300 +16851,6 @@
 </p:sld>
 </file>
 
-<file path=ppt/slides/slide9.xml><?xml version="1.0" encoding="utf-8"?>
-<p:sld xmlns:a="http://schemas.openxmlformats.org/drawingml/2006/main" xmlns:r="http://schemas.openxmlformats.org/officeDocument/2006/relationships" xmlns:p="http://schemas.openxmlformats.org/presentationml/2006/main">
-  <p:cSld>
-    <p:spTree>
-      <p:nvGrpSpPr>
-        <p:cNvPr id="1" name=""/>
-        <p:cNvGrpSpPr/>
-        <p:nvPr/>
-      </p:nvGrpSpPr>
-      <p:grpSpPr>
-        <a:xfrm>
-          <a:off x="0" y="0"/>
-          <a:ext cx="0" cy="0"/>
-          <a:chOff x="0" y="0"/>
-          <a:chExt cx="0" cy="0"/>
-        </a:xfrm>
-      </p:grpSpPr>
-      <p:pic>
-        <p:nvPicPr>
-          <p:cNvPr id="26" name="Picture 25">
-            <a:extLst>
-              <a:ext uri="{FF2B5EF4-FFF2-40B4-BE49-F238E27FC236}">
-                <a16:creationId xmlns:a16="http://schemas.microsoft.com/office/drawing/2014/main" id="{AAF9970A-E073-4AF8-AF1D-B57F080827B7}"/>
-              </a:ext>
-            </a:extLst>
-          </p:cNvPr>
-          <p:cNvPicPr>
-            <a:picLocks noChangeAspect="1"/>
-          </p:cNvPicPr>
-          <p:nvPr/>
-        </p:nvPicPr>
-        <p:blipFill>
-          <a:blip r:embed="rId2"/>
-          <a:stretch>
-            <a:fillRect/>
-          </a:stretch>
-        </p:blipFill>
-        <p:spPr>
-          <a:xfrm>
-            <a:off x="838200" y="2042078"/>
-            <a:ext cx="9747738" cy="2499159"/>
-          </a:xfrm>
-          <a:prstGeom prst="rect">
-            <a:avLst/>
-          </a:prstGeom>
-        </p:spPr>
-      </p:pic>
-      <p:sp>
-        <p:nvSpPr>
-          <p:cNvPr id="2" name="Title 1">
-            <a:extLst>
-              <a:ext uri="{FF2B5EF4-FFF2-40B4-BE49-F238E27FC236}">
-                <a16:creationId xmlns:a16="http://schemas.microsoft.com/office/drawing/2014/main" id="{7F6BCDD3-50C0-4950-853C-38B03F912153}"/>
-              </a:ext>
-            </a:extLst>
-          </p:cNvPr>
-          <p:cNvSpPr>
-            <a:spLocks noGrp="1"/>
-          </p:cNvSpPr>
-          <p:nvPr>
-            <p:ph type="title"/>
-          </p:nvPr>
-        </p:nvSpPr>
-        <p:spPr/>
-        <p:txBody>
-          <a:bodyPr/>
-          <a:lstStyle/>
-          <a:p>
-            <a:r>
-              <a:rPr lang="pl-PL" dirty="0" err="1"/>
-              <a:t>Page</a:t>
-            </a:r>
-            <a:r>
-              <a:rPr lang="pl-PL" dirty="0"/>
-              <a:t> not </a:t>
-            </a:r>
-            <a:r>
-              <a:rPr lang="pl-PL" dirty="0" err="1"/>
-              <a:t>found</a:t>
-            </a:r>
-            <a:endParaRPr lang="pl-PL" dirty="0"/>
-          </a:p>
-        </p:txBody>
-      </p:sp>
-      <p:sp>
-        <p:nvSpPr>
-          <p:cNvPr id="6" name="Rectangle 5">
-            <a:extLst>
-              <a:ext uri="{FF2B5EF4-FFF2-40B4-BE49-F238E27FC236}">
-                <a16:creationId xmlns:a16="http://schemas.microsoft.com/office/drawing/2014/main" id="{DAFE0565-112F-4752-898F-A0F3D605EC28}"/>
-              </a:ext>
-            </a:extLst>
-          </p:cNvPr>
-          <p:cNvSpPr/>
-          <p:nvPr/>
-        </p:nvSpPr>
-        <p:spPr>
-          <a:xfrm>
-            <a:off x="838200" y="3509602"/>
-            <a:ext cx="2643554" cy="550984"/>
-          </a:xfrm>
-          <a:prstGeom prst="rect">
-            <a:avLst/>
-          </a:prstGeom>
-        </p:spPr>
-        <p:style>
-          <a:lnRef idx="2">
-            <a:schemeClr val="accent6">
-              <a:shade val="50000"/>
-            </a:schemeClr>
-          </a:lnRef>
-          <a:fillRef idx="1">
-            <a:schemeClr val="accent6"/>
-          </a:fillRef>
-          <a:effectRef idx="0">
-            <a:schemeClr val="accent6"/>
-          </a:effectRef>
-          <a:fontRef idx="minor">
-            <a:schemeClr val="lt1"/>
-          </a:fontRef>
-        </p:style>
-        <p:txBody>
-          <a:bodyPr rtlCol="0" anchor="ctr"/>
-          <a:lstStyle/>
-          <a:p>
-            <a:pPr algn="ctr"/>
-            <a:r>
-              <a:rPr lang="pl-PL" dirty="0"/>
-              <a:t>App.js</a:t>
-            </a:r>
-          </a:p>
-        </p:txBody>
-      </p:sp>
-      <p:sp>
-        <p:nvSpPr>
-          <p:cNvPr id="7" name="TextBox 6">
-            <a:extLst>
-              <a:ext uri="{FF2B5EF4-FFF2-40B4-BE49-F238E27FC236}">
-                <a16:creationId xmlns:a16="http://schemas.microsoft.com/office/drawing/2014/main" id="{1BC91E6D-E4E7-4E28-883E-A51B546DE4EE}"/>
-              </a:ext>
-            </a:extLst>
-          </p:cNvPr>
-          <p:cNvSpPr txBox="1"/>
-          <p:nvPr/>
-        </p:nvSpPr>
-        <p:spPr>
-          <a:xfrm>
-            <a:off x="838200" y="4060586"/>
-            <a:ext cx="9747738" cy="1938992"/>
-          </a:xfrm>
-          <a:prstGeom prst="rect">
-            <a:avLst/>
-          </a:prstGeom>
-          <a:noFill/>
-          <a:ln>
-            <a:solidFill>
-              <a:schemeClr val="accent1">
-                <a:shade val="50000"/>
-              </a:schemeClr>
-            </a:solidFill>
-          </a:ln>
-        </p:spPr>
-        <p:txBody>
-          <a:bodyPr wrap="square" rtlCol="0">
-            <a:spAutoFit/>
-          </a:bodyPr>
-          <a:lstStyle/>
-          <a:p>
-            <a:r>
-              <a:rPr lang="pl-PL" sz="2000" b="0" dirty="0">
-                <a:solidFill>
-                  <a:srgbClr val="808080"/>
-                </a:solidFill>
-                <a:effectLst/>
-                <a:latin typeface="Consolas" panose="020B0609020204030204" pitchFamily="49" charset="0"/>
-              </a:rPr>
-              <a:t>&lt;</a:t>
-            </a:r>
-            <a:r>
-              <a:rPr lang="pl-PL" sz="2000" b="0" dirty="0">
-                <a:solidFill>
-                  <a:srgbClr val="00B050"/>
-                </a:solidFill>
-                <a:effectLst/>
-                <a:latin typeface="Consolas" panose="020B0609020204030204" pitchFamily="49" charset="0"/>
-              </a:rPr>
-              <a:t>Switch</a:t>
-            </a:r>
-            <a:r>
-              <a:rPr lang="pl-PL" sz="2000" b="0" dirty="0">
-                <a:solidFill>
-                  <a:srgbClr val="808080"/>
-                </a:solidFill>
-                <a:effectLst/>
-                <a:latin typeface="Consolas" panose="020B0609020204030204" pitchFamily="49" charset="0"/>
-              </a:rPr>
-              <a:t>&gt;</a:t>
-            </a:r>
-            <a:endParaRPr lang="pl-PL" sz="2000" b="0" dirty="0">
-              <a:solidFill>
-                <a:srgbClr val="D4D4D4"/>
-              </a:solidFill>
-              <a:effectLst/>
-              <a:latin typeface="Consolas" panose="020B0609020204030204" pitchFamily="49" charset="0"/>
-            </a:endParaRPr>
-          </a:p>
-          <a:p>
-            <a:r>
-              <a:rPr lang="pl-PL" sz="2000" b="0" dirty="0">
-                <a:solidFill>
-                  <a:srgbClr val="D4D4D4"/>
-                </a:solidFill>
-                <a:effectLst/>
-                <a:latin typeface="Consolas" panose="020B0609020204030204" pitchFamily="49" charset="0"/>
-              </a:rPr>
-              <a:t>    </a:t>
-            </a:r>
-            <a:r>
-              <a:rPr lang="pl-PL" sz="2000" b="0" dirty="0">
-                <a:solidFill>
-                  <a:srgbClr val="808080"/>
-                </a:solidFill>
-                <a:effectLst/>
-                <a:latin typeface="Consolas" panose="020B0609020204030204" pitchFamily="49" charset="0"/>
-              </a:rPr>
-              <a:t>&lt;</a:t>
-            </a:r>
-            <a:r>
-              <a:rPr lang="pl-PL" sz="2000" b="0" dirty="0" err="1">
-                <a:solidFill>
-                  <a:srgbClr val="00B050"/>
-                </a:solidFill>
-                <a:effectLst/>
-                <a:latin typeface="Consolas" panose="020B0609020204030204" pitchFamily="49" charset="0"/>
-              </a:rPr>
-              <a:t>Route</a:t>
-            </a:r>
-            <a:r>
-              <a:rPr lang="pl-PL" sz="2000" b="0" dirty="0">
-                <a:solidFill>
-                  <a:srgbClr val="D4D4D4"/>
-                </a:solidFill>
-                <a:effectLst/>
-                <a:latin typeface="Consolas" panose="020B0609020204030204" pitchFamily="49" charset="0"/>
-              </a:rPr>
-              <a:t> </a:t>
-            </a:r>
-            <a:r>
-              <a:rPr lang="pl-PL" sz="2000" b="0" dirty="0" err="1">
-                <a:solidFill>
-                  <a:srgbClr val="00B0F0"/>
-                </a:solidFill>
-                <a:effectLst/>
-                <a:latin typeface="Consolas" panose="020B0609020204030204" pitchFamily="49" charset="0"/>
-              </a:rPr>
-              <a:t>path</a:t>
-            </a:r>
-            <a:r>
-              <a:rPr lang="pl-PL" sz="2000" b="0" dirty="0">
-                <a:solidFill>
-                  <a:schemeClr val="bg1">
-                    <a:lumMod val="50000"/>
-                  </a:schemeClr>
-                </a:solidFill>
-                <a:effectLst/>
-                <a:latin typeface="Consolas" panose="020B0609020204030204" pitchFamily="49" charset="0"/>
-              </a:rPr>
-              <a:t>=</a:t>
-            </a:r>
-            <a:r>
-              <a:rPr lang="pl-PL" sz="2000" b="0" dirty="0">
-                <a:solidFill>
-                  <a:srgbClr val="C00000"/>
-                </a:solidFill>
-                <a:effectLst/>
-                <a:latin typeface="Consolas" panose="020B0609020204030204" pitchFamily="49" charset="0"/>
-              </a:rPr>
-              <a:t>"/"</a:t>
-            </a:r>
-            <a:r>
-              <a:rPr lang="pl-PL" sz="2000" b="0" dirty="0">
-                <a:solidFill>
-                  <a:srgbClr val="D4D4D4"/>
-                </a:solidFill>
-                <a:effectLst/>
-                <a:latin typeface="Consolas" panose="020B0609020204030204" pitchFamily="49" charset="0"/>
-              </a:rPr>
-              <a:t> </a:t>
-            </a:r>
-            <a:r>
-              <a:rPr lang="pl-PL" sz="2000" b="0" dirty="0" err="1">
-                <a:solidFill>
-                  <a:srgbClr val="00B0F0"/>
-                </a:solidFill>
-                <a:effectLst/>
-                <a:latin typeface="Consolas" panose="020B0609020204030204" pitchFamily="49" charset="0"/>
-              </a:rPr>
-              <a:t>exact</a:t>
-            </a:r>
-            <a:r>
-              <a:rPr lang="pl-PL" sz="2000" b="0" dirty="0">
-                <a:solidFill>
-                  <a:srgbClr val="D4D4D4"/>
-                </a:solidFill>
-                <a:effectLst/>
-                <a:latin typeface="Consolas" panose="020B0609020204030204" pitchFamily="49" charset="0"/>
-              </a:rPr>
-              <a:t> </a:t>
-            </a:r>
-            <a:r>
-              <a:rPr lang="pl-PL" sz="2000" b="0" dirty="0">
-                <a:solidFill>
-                  <a:srgbClr val="00B0F0"/>
-                </a:solidFill>
-                <a:effectLst/>
-                <a:latin typeface="Consolas" panose="020B0609020204030204" pitchFamily="49" charset="0"/>
-              </a:rPr>
-              <a:t>component</a:t>
-            </a:r>
-            <a:r>
-              <a:rPr lang="pl-PL" sz="2000" b="0" dirty="0">
-                <a:solidFill>
-                  <a:schemeClr val="bg1">
-                    <a:lumMod val="50000"/>
-                  </a:schemeClr>
-                </a:solidFill>
-                <a:effectLst/>
-                <a:latin typeface="Consolas" panose="020B0609020204030204" pitchFamily="49" charset="0"/>
-              </a:rPr>
-              <a:t>=</a:t>
-            </a:r>
-            <a:r>
-              <a:rPr lang="pl-PL" sz="2000" b="0" dirty="0">
-                <a:solidFill>
-                  <a:srgbClr val="569CD6"/>
-                </a:solidFill>
-                <a:effectLst/>
-                <a:latin typeface="Consolas" panose="020B0609020204030204" pitchFamily="49" charset="0"/>
-              </a:rPr>
-              <a:t>{</a:t>
-            </a:r>
-            <a:r>
-              <a:rPr lang="pl-PL" sz="2000" b="0" dirty="0" err="1">
-                <a:solidFill>
-                  <a:srgbClr val="FFC000"/>
-                </a:solidFill>
-                <a:effectLst/>
-                <a:latin typeface="Consolas" panose="020B0609020204030204" pitchFamily="49" charset="0"/>
-              </a:rPr>
-              <a:t>Welcome</a:t>
-            </a:r>
-            <a:r>
-              <a:rPr lang="pl-PL" sz="2000" b="0" dirty="0">
-                <a:solidFill>
-                  <a:srgbClr val="569CD6"/>
-                </a:solidFill>
-                <a:effectLst/>
-                <a:latin typeface="Consolas" panose="020B0609020204030204" pitchFamily="49" charset="0"/>
-              </a:rPr>
-              <a:t>}</a:t>
-            </a:r>
-            <a:r>
-              <a:rPr lang="pl-PL" sz="2000" b="0" dirty="0">
-                <a:solidFill>
-                  <a:srgbClr val="808080"/>
-                </a:solidFill>
-                <a:effectLst/>
-                <a:latin typeface="Consolas" panose="020B0609020204030204" pitchFamily="49" charset="0"/>
-              </a:rPr>
-              <a:t>&gt;&lt;/</a:t>
-            </a:r>
-            <a:r>
-              <a:rPr lang="pl-PL" sz="2000" b="0" dirty="0" err="1">
-                <a:solidFill>
-                  <a:srgbClr val="00B050"/>
-                </a:solidFill>
-                <a:effectLst/>
-                <a:latin typeface="Consolas" panose="020B0609020204030204" pitchFamily="49" charset="0"/>
-              </a:rPr>
-              <a:t>Route</a:t>
-            </a:r>
-            <a:r>
-              <a:rPr lang="pl-PL" sz="2000" b="0" dirty="0">
-                <a:solidFill>
-                  <a:srgbClr val="808080"/>
-                </a:solidFill>
-                <a:effectLst/>
-                <a:latin typeface="Consolas" panose="020B0609020204030204" pitchFamily="49" charset="0"/>
-              </a:rPr>
-              <a:t>&gt;</a:t>
-            </a:r>
-            <a:endParaRPr lang="pl-PL" sz="2000" b="0" dirty="0">
-              <a:solidFill>
-                <a:srgbClr val="D4D4D4"/>
-              </a:solidFill>
-              <a:effectLst/>
-              <a:latin typeface="Consolas" panose="020B0609020204030204" pitchFamily="49" charset="0"/>
-            </a:endParaRPr>
-          </a:p>
-          <a:p>
-            <a:r>
-              <a:rPr lang="pl-PL" sz="2000" b="0" dirty="0">
-                <a:solidFill>
-                  <a:srgbClr val="D4D4D4"/>
-                </a:solidFill>
-                <a:effectLst/>
-                <a:latin typeface="Consolas" panose="020B0609020204030204" pitchFamily="49" charset="0"/>
-              </a:rPr>
-              <a:t>    </a:t>
-            </a:r>
-            <a:r>
-              <a:rPr lang="pl-PL" sz="2000" b="0" dirty="0">
-                <a:solidFill>
-                  <a:srgbClr val="808080"/>
-                </a:solidFill>
-                <a:effectLst/>
-                <a:latin typeface="Consolas" panose="020B0609020204030204" pitchFamily="49" charset="0"/>
-              </a:rPr>
-              <a:t>&lt;</a:t>
-            </a:r>
-            <a:r>
-              <a:rPr lang="pl-PL" sz="2000" b="0" dirty="0" err="1">
-                <a:solidFill>
-                  <a:srgbClr val="00B050"/>
-                </a:solidFill>
-                <a:effectLst/>
-                <a:latin typeface="Consolas" panose="020B0609020204030204" pitchFamily="49" charset="0"/>
-              </a:rPr>
-              <a:t>Route</a:t>
-            </a:r>
-            <a:r>
-              <a:rPr lang="pl-PL" sz="2000" b="0" dirty="0">
-                <a:solidFill>
-                  <a:srgbClr val="D4D4D4"/>
-                </a:solidFill>
-                <a:effectLst/>
-                <a:latin typeface="Consolas" panose="020B0609020204030204" pitchFamily="49" charset="0"/>
-              </a:rPr>
-              <a:t> </a:t>
-            </a:r>
-            <a:r>
-              <a:rPr lang="pl-PL" sz="2000" b="0" dirty="0" err="1">
-                <a:solidFill>
-                  <a:srgbClr val="00B0F0"/>
-                </a:solidFill>
-                <a:effectLst/>
-                <a:latin typeface="Consolas" panose="020B0609020204030204" pitchFamily="49" charset="0"/>
-              </a:rPr>
-              <a:t>path</a:t>
-            </a:r>
-            <a:r>
-              <a:rPr lang="pl-PL" sz="2000" b="0" dirty="0">
-                <a:solidFill>
-                  <a:schemeClr val="bg1">
-                    <a:lumMod val="50000"/>
-                  </a:schemeClr>
-                </a:solidFill>
-                <a:effectLst/>
-                <a:latin typeface="Consolas" panose="020B0609020204030204" pitchFamily="49" charset="0"/>
-              </a:rPr>
-              <a:t>=</a:t>
-            </a:r>
-            <a:r>
-              <a:rPr lang="pl-PL" sz="2000" b="0" dirty="0">
-                <a:solidFill>
-                  <a:srgbClr val="C00000"/>
-                </a:solidFill>
-                <a:effectLst/>
-                <a:latin typeface="Consolas" panose="020B0609020204030204" pitchFamily="49" charset="0"/>
-              </a:rPr>
-              <a:t>"/</a:t>
-            </a:r>
-            <a:r>
-              <a:rPr lang="pl-PL" sz="2000" b="0" dirty="0" err="1">
-                <a:solidFill>
-                  <a:srgbClr val="C00000"/>
-                </a:solidFill>
-                <a:effectLst/>
-                <a:latin typeface="Consolas" panose="020B0609020204030204" pitchFamily="49" charset="0"/>
-              </a:rPr>
-              <a:t>heroes</a:t>
-            </a:r>
-            <a:r>
-              <a:rPr lang="pl-PL" sz="2000" b="0" dirty="0">
-                <a:solidFill>
-                  <a:srgbClr val="C00000"/>
-                </a:solidFill>
-                <a:effectLst/>
-                <a:latin typeface="Consolas" panose="020B0609020204030204" pitchFamily="49" charset="0"/>
-              </a:rPr>
-              <a:t>"</a:t>
-            </a:r>
-            <a:r>
-              <a:rPr lang="pl-PL" sz="2000" b="0" dirty="0">
-                <a:solidFill>
-                  <a:srgbClr val="D4D4D4"/>
-                </a:solidFill>
-                <a:effectLst/>
-                <a:latin typeface="Consolas" panose="020B0609020204030204" pitchFamily="49" charset="0"/>
-              </a:rPr>
-              <a:t> </a:t>
-            </a:r>
-            <a:r>
-              <a:rPr lang="pl-PL" sz="2000" b="0" dirty="0">
-                <a:solidFill>
-                  <a:srgbClr val="00B0F0"/>
-                </a:solidFill>
-                <a:effectLst/>
-                <a:latin typeface="Consolas" panose="020B0609020204030204" pitchFamily="49" charset="0"/>
-              </a:rPr>
-              <a:t>component</a:t>
-            </a:r>
-            <a:r>
-              <a:rPr lang="pl-PL" sz="2000" b="0" dirty="0">
-                <a:solidFill>
-                  <a:schemeClr val="bg1">
-                    <a:lumMod val="50000"/>
-                  </a:schemeClr>
-                </a:solidFill>
-                <a:effectLst/>
-                <a:latin typeface="Consolas" panose="020B0609020204030204" pitchFamily="49" charset="0"/>
-              </a:rPr>
-              <a:t>=</a:t>
-            </a:r>
-            <a:r>
-              <a:rPr lang="pl-PL" sz="2000" b="0" dirty="0">
-                <a:solidFill>
-                  <a:srgbClr val="569CD6"/>
-                </a:solidFill>
-                <a:effectLst/>
-                <a:latin typeface="Consolas" panose="020B0609020204030204" pitchFamily="49" charset="0"/>
-              </a:rPr>
-              <a:t>{</a:t>
-            </a:r>
-            <a:r>
-              <a:rPr lang="pl-PL" sz="2000" b="0" dirty="0" err="1">
-                <a:solidFill>
-                  <a:srgbClr val="00B050"/>
-                </a:solidFill>
-                <a:effectLst/>
-                <a:latin typeface="Consolas" panose="020B0609020204030204" pitchFamily="49" charset="0"/>
-              </a:rPr>
-              <a:t>HeroesList</a:t>
-            </a:r>
-            <a:r>
-              <a:rPr lang="pl-PL" sz="2000" b="0" dirty="0">
-                <a:solidFill>
-                  <a:srgbClr val="569CD6"/>
-                </a:solidFill>
-                <a:effectLst/>
-                <a:latin typeface="Consolas" panose="020B0609020204030204" pitchFamily="49" charset="0"/>
-              </a:rPr>
-              <a:t>}</a:t>
-            </a:r>
-            <a:r>
-              <a:rPr lang="pl-PL" sz="2000" b="0" dirty="0">
-                <a:solidFill>
-                  <a:srgbClr val="808080"/>
-                </a:solidFill>
-                <a:effectLst/>
-                <a:latin typeface="Consolas" panose="020B0609020204030204" pitchFamily="49" charset="0"/>
-              </a:rPr>
-              <a:t>&gt;&lt;/</a:t>
-            </a:r>
-            <a:r>
-              <a:rPr lang="pl-PL" sz="2000" b="0" dirty="0" err="1">
-                <a:solidFill>
-                  <a:srgbClr val="00B050"/>
-                </a:solidFill>
-                <a:effectLst/>
-                <a:latin typeface="Consolas" panose="020B0609020204030204" pitchFamily="49" charset="0"/>
-              </a:rPr>
-              <a:t>Route</a:t>
-            </a:r>
-            <a:r>
-              <a:rPr lang="pl-PL" sz="2000" b="0" dirty="0">
-                <a:solidFill>
-                  <a:srgbClr val="808080"/>
-                </a:solidFill>
-                <a:effectLst/>
-                <a:latin typeface="Consolas" panose="020B0609020204030204" pitchFamily="49" charset="0"/>
-              </a:rPr>
-              <a:t>&gt;</a:t>
-            </a:r>
-            <a:endParaRPr lang="pl-PL" sz="2000" b="0" dirty="0">
-              <a:solidFill>
-                <a:srgbClr val="D4D4D4"/>
-              </a:solidFill>
-              <a:effectLst/>
-              <a:latin typeface="Consolas" panose="020B0609020204030204" pitchFamily="49" charset="0"/>
-            </a:endParaRPr>
-          </a:p>
-          <a:p>
-            <a:r>
-              <a:rPr lang="pl-PL" sz="2000" b="0" dirty="0">
-                <a:solidFill>
-                  <a:srgbClr val="D4D4D4"/>
-                </a:solidFill>
-                <a:effectLst/>
-                <a:latin typeface="Consolas" panose="020B0609020204030204" pitchFamily="49" charset="0"/>
-              </a:rPr>
-              <a:t>    </a:t>
-            </a:r>
-            <a:r>
-              <a:rPr lang="pl-PL" sz="2000" b="0" dirty="0">
-                <a:solidFill>
-                  <a:srgbClr val="808080"/>
-                </a:solidFill>
-                <a:effectLst/>
-                <a:latin typeface="Consolas" panose="020B0609020204030204" pitchFamily="49" charset="0"/>
-              </a:rPr>
-              <a:t>&lt;</a:t>
-            </a:r>
-            <a:r>
-              <a:rPr lang="pl-PL" sz="2000" b="0" dirty="0" err="1">
-                <a:solidFill>
-                  <a:srgbClr val="00B050"/>
-                </a:solidFill>
-                <a:effectLst/>
-                <a:latin typeface="Consolas" panose="020B0609020204030204" pitchFamily="49" charset="0"/>
-              </a:rPr>
-              <a:t>Route</a:t>
-            </a:r>
-            <a:r>
-              <a:rPr lang="pl-PL" sz="2000" b="0" dirty="0">
-                <a:solidFill>
-                  <a:srgbClr val="D4D4D4"/>
-                </a:solidFill>
-                <a:effectLst/>
-                <a:latin typeface="Consolas" panose="020B0609020204030204" pitchFamily="49" charset="0"/>
-              </a:rPr>
-              <a:t> </a:t>
-            </a:r>
-            <a:r>
-              <a:rPr lang="pl-PL" sz="2000" b="0" dirty="0">
-                <a:solidFill>
-                  <a:srgbClr val="00B0F0"/>
-                </a:solidFill>
-                <a:effectLst/>
-                <a:latin typeface="Consolas" panose="020B0609020204030204" pitchFamily="49" charset="0"/>
-              </a:rPr>
-              <a:t>component</a:t>
-            </a:r>
-            <a:r>
-              <a:rPr lang="pl-PL" sz="2000" b="0" dirty="0">
-                <a:solidFill>
-                  <a:schemeClr val="bg1">
-                    <a:lumMod val="50000"/>
-                  </a:schemeClr>
-                </a:solidFill>
-                <a:effectLst/>
-                <a:latin typeface="Consolas" panose="020B0609020204030204" pitchFamily="49" charset="0"/>
-              </a:rPr>
-              <a:t>=</a:t>
-            </a:r>
-            <a:r>
-              <a:rPr lang="pl-PL" sz="2000" b="0" dirty="0">
-                <a:solidFill>
-                  <a:srgbClr val="569CD6"/>
-                </a:solidFill>
-                <a:effectLst/>
-                <a:latin typeface="Consolas" panose="020B0609020204030204" pitchFamily="49" charset="0"/>
-              </a:rPr>
-              <a:t>{</a:t>
-            </a:r>
-            <a:r>
-              <a:rPr lang="pl-PL" sz="2000" b="0" dirty="0" err="1">
-                <a:solidFill>
-                  <a:srgbClr val="FFC000"/>
-                </a:solidFill>
-                <a:effectLst/>
-                <a:latin typeface="Consolas" panose="020B0609020204030204" pitchFamily="49" charset="0"/>
-              </a:rPr>
-              <a:t>PageNotFound</a:t>
-            </a:r>
-            <a:r>
-              <a:rPr lang="pl-PL" sz="2000" b="0" dirty="0">
-                <a:solidFill>
-                  <a:srgbClr val="569CD6"/>
-                </a:solidFill>
-                <a:effectLst/>
-                <a:latin typeface="Consolas" panose="020B0609020204030204" pitchFamily="49" charset="0"/>
-              </a:rPr>
-              <a:t>}</a:t>
-            </a:r>
-            <a:r>
-              <a:rPr lang="pl-PL" sz="2000" b="0" dirty="0">
-                <a:solidFill>
-                  <a:srgbClr val="808080"/>
-                </a:solidFill>
-                <a:effectLst/>
-                <a:latin typeface="Consolas" panose="020B0609020204030204" pitchFamily="49" charset="0"/>
-              </a:rPr>
-              <a:t>&gt;&lt;/</a:t>
-            </a:r>
-            <a:r>
-              <a:rPr lang="pl-PL" sz="2000" b="0" dirty="0" err="1">
-                <a:solidFill>
-                  <a:srgbClr val="00B050"/>
-                </a:solidFill>
-                <a:effectLst/>
-                <a:latin typeface="Consolas" panose="020B0609020204030204" pitchFamily="49" charset="0"/>
-              </a:rPr>
-              <a:t>Route</a:t>
-            </a:r>
-            <a:r>
-              <a:rPr lang="pl-PL" sz="2000" b="0" dirty="0">
-                <a:solidFill>
-                  <a:srgbClr val="808080"/>
-                </a:solidFill>
-                <a:effectLst/>
-                <a:latin typeface="Consolas" panose="020B0609020204030204" pitchFamily="49" charset="0"/>
-              </a:rPr>
-              <a:t>&gt;</a:t>
-            </a:r>
-            <a:endParaRPr lang="pl-PL" sz="2000" dirty="0">
-              <a:solidFill>
-                <a:srgbClr val="D4D4D4"/>
-              </a:solidFill>
-              <a:latin typeface="Consolas" panose="020B0609020204030204" pitchFamily="49" charset="0"/>
-            </a:endParaRPr>
-          </a:p>
-          <a:p>
-            <a:r>
-              <a:rPr lang="pl-PL" sz="2000" b="0" dirty="0">
-                <a:solidFill>
-                  <a:srgbClr val="808080"/>
-                </a:solidFill>
-                <a:effectLst/>
-                <a:latin typeface="Consolas" panose="020B0609020204030204" pitchFamily="49" charset="0"/>
-              </a:rPr>
-              <a:t>&lt;/</a:t>
-            </a:r>
-            <a:r>
-              <a:rPr lang="pl-PL" sz="2000" b="0" dirty="0">
-                <a:solidFill>
-                  <a:srgbClr val="00B050"/>
-                </a:solidFill>
-                <a:effectLst/>
-                <a:latin typeface="Consolas" panose="020B0609020204030204" pitchFamily="49" charset="0"/>
-              </a:rPr>
-              <a:t>Switch</a:t>
-            </a:r>
-            <a:r>
-              <a:rPr lang="pl-PL" sz="2000" b="0" dirty="0">
-                <a:solidFill>
-                  <a:srgbClr val="808080"/>
-                </a:solidFill>
-                <a:effectLst/>
-                <a:latin typeface="Consolas" panose="020B0609020204030204" pitchFamily="49" charset="0"/>
-              </a:rPr>
-              <a:t>&gt;</a:t>
-            </a:r>
-            <a:endParaRPr lang="pl-PL" sz="2000" b="0" dirty="0">
-              <a:solidFill>
-                <a:srgbClr val="D4D4D4"/>
-              </a:solidFill>
-              <a:effectLst/>
-              <a:latin typeface="Consolas" panose="020B0609020204030204" pitchFamily="49" charset="0"/>
-            </a:endParaRPr>
-          </a:p>
-          <a:p>
-            <a:endParaRPr lang="en-US" sz="2000" b="0" dirty="0">
-              <a:solidFill>
-                <a:srgbClr val="D4D4D4"/>
-              </a:solidFill>
-              <a:effectLst/>
-              <a:latin typeface="Consolas" panose="020B0609020204030204" pitchFamily="49" charset="0"/>
-            </a:endParaRPr>
-          </a:p>
-        </p:txBody>
-      </p:sp>
-      <p:pic>
-        <p:nvPicPr>
-          <p:cNvPr id="22" name="Picture 21">
-            <a:extLst>
-              <a:ext uri="{FF2B5EF4-FFF2-40B4-BE49-F238E27FC236}">
-                <a16:creationId xmlns:a16="http://schemas.microsoft.com/office/drawing/2014/main" id="{E6322520-ADD0-4634-A2F8-911A421A6683}"/>
-              </a:ext>
-            </a:extLst>
-          </p:cNvPr>
-          <p:cNvPicPr>
-            <a:picLocks noChangeAspect="1"/>
-          </p:cNvPicPr>
-          <p:nvPr/>
-        </p:nvPicPr>
-        <p:blipFill>
-          <a:blip r:embed="rId3"/>
-          <a:stretch>
-            <a:fillRect/>
-          </a:stretch>
-        </p:blipFill>
-        <p:spPr>
-          <a:xfrm>
-            <a:off x="838200" y="1590230"/>
-            <a:ext cx="9747738" cy="451848"/>
-          </a:xfrm>
-          <a:prstGeom prst="rect">
-            <a:avLst/>
-          </a:prstGeom>
-        </p:spPr>
-      </p:pic>
-    </p:spTree>
-    <p:extLst>
-      <p:ext uri="{BB962C8B-B14F-4D97-AF65-F5344CB8AC3E}">
-        <p14:creationId xmlns:p14="http://schemas.microsoft.com/office/powerpoint/2010/main" val="3674942756"/>
-      </p:ext>
-    </p:extLst>
-  </p:cSld>
-  <p:clrMapOvr>
-    <a:masterClrMapping/>
-  </p:clrMapOvr>
-  <p:timing>
-    <p:tnLst>
-      <p:par>
-        <p:cTn id="1" dur="indefinite" restart="never" nodeType="tmRoot">
-          <p:childTnLst>
-            <p:seq concurrent="1" nextAc="seek">
-              <p:cTn id="2" dur="indefinite" nodeType="mainSeq">
-                <p:childTnLst>
-                  <p:par>
-                    <p:cTn id="3" fill="hold">
-                      <p:stCondLst>
-                        <p:cond delay="indefinite"/>
-                      </p:stCondLst>
-                      <p:childTnLst>
-                        <p:par>
-                          <p:cTn id="4" fill="hold">
-                            <p:stCondLst>
-                              <p:cond delay="0"/>
-                            </p:stCondLst>
-                            <p:childTnLst>
-                              <p:par>
-                                <p:cTn id="5" presetID="10" presetClass="entr" presetSubtype="0" fill="hold" nodeType="clickEffect">
-                                  <p:stCondLst>
-                                    <p:cond delay="0"/>
-                                  </p:stCondLst>
-                                  <p:childTnLst>
-                                    <p:set>
-                                      <p:cBhvr>
-                                        <p:cTn id="6" dur="1" fill="hold">
-                                          <p:stCondLst>
-                                            <p:cond delay="0"/>
-                                          </p:stCondLst>
-                                        </p:cTn>
-                                        <p:tgtEl>
-                                          <p:spTgt spid="22"/>
-                                        </p:tgtEl>
-                                        <p:attrNameLst>
-                                          <p:attrName>style.visibility</p:attrName>
-                                        </p:attrNameLst>
-                                      </p:cBhvr>
-                                      <p:to>
-                                        <p:strVal val="visible"/>
-                                      </p:to>
-                                    </p:set>
-                                    <p:animEffect transition="in" filter="fade">
-                                      <p:cBhvr>
-                                        <p:cTn id="7" dur="500"/>
-                                        <p:tgtEl>
-                                          <p:spTgt spid="22"/>
-                                        </p:tgtEl>
-                                      </p:cBhvr>
-                                    </p:animEffect>
-                                  </p:childTnLst>
-                                </p:cTn>
-                              </p:par>
-                            </p:childTnLst>
-                          </p:cTn>
-                        </p:par>
-                      </p:childTnLst>
-                    </p:cTn>
-                  </p:par>
-                  <p:par>
-                    <p:cTn id="8" fill="hold">
-                      <p:stCondLst>
-                        <p:cond delay="indefinite"/>
-                      </p:stCondLst>
-                      <p:childTnLst>
-                        <p:par>
-                          <p:cTn id="9" fill="hold">
-                            <p:stCondLst>
-                              <p:cond delay="0"/>
-                            </p:stCondLst>
-                            <p:childTnLst>
-                              <p:par>
-                                <p:cTn id="10" presetID="10" presetClass="entr" presetSubtype="0" fill="hold" grpId="0" nodeType="clickEffect">
-                                  <p:stCondLst>
-                                    <p:cond delay="0"/>
-                                  </p:stCondLst>
-                                  <p:childTnLst>
-                                    <p:set>
-                                      <p:cBhvr>
-                                        <p:cTn id="11" dur="1" fill="hold">
-                                          <p:stCondLst>
-                                            <p:cond delay="0"/>
-                                          </p:stCondLst>
-                                        </p:cTn>
-                                        <p:tgtEl>
-                                          <p:spTgt spid="6"/>
-                                        </p:tgtEl>
-                                        <p:attrNameLst>
-                                          <p:attrName>style.visibility</p:attrName>
-                                        </p:attrNameLst>
-                                      </p:cBhvr>
-                                      <p:to>
-                                        <p:strVal val="visible"/>
-                                      </p:to>
-                                    </p:set>
-                                    <p:animEffect transition="in" filter="fade">
-                                      <p:cBhvr>
-                                        <p:cTn id="12" dur="500"/>
-                                        <p:tgtEl>
-                                          <p:spTgt spid="6"/>
-                                        </p:tgtEl>
-                                      </p:cBhvr>
-                                    </p:animEffect>
-                                  </p:childTnLst>
-                                </p:cTn>
-                              </p:par>
-                              <p:par>
-                                <p:cTn id="13" presetID="10" presetClass="entr" presetSubtype="0" fill="hold" grpId="0" nodeType="withEffect">
-                                  <p:stCondLst>
-                                    <p:cond delay="0"/>
-                                  </p:stCondLst>
-                                  <p:childTnLst>
-                                    <p:set>
-                                      <p:cBhvr>
-                                        <p:cTn id="14" dur="1" fill="hold">
-                                          <p:stCondLst>
-                                            <p:cond delay="0"/>
-                                          </p:stCondLst>
-                                        </p:cTn>
-                                        <p:tgtEl>
-                                          <p:spTgt spid="7"/>
-                                        </p:tgtEl>
-                                        <p:attrNameLst>
-                                          <p:attrName>style.visibility</p:attrName>
-                                        </p:attrNameLst>
-                                      </p:cBhvr>
-                                      <p:to>
-                                        <p:strVal val="visible"/>
-                                      </p:to>
-                                    </p:set>
-                                    <p:animEffect transition="in" filter="fade">
-                                      <p:cBhvr>
-                                        <p:cTn id="15" dur="500"/>
-                                        <p:tgtEl>
-                                          <p:spTgt spid="7"/>
-                                        </p:tgtEl>
-                                      </p:cBhvr>
-                                    </p:animEffect>
-                                  </p:childTnLst>
-                                </p:cTn>
-                              </p:par>
-                              <p:par>
-                                <p:cTn id="16" presetID="10" presetClass="entr" presetSubtype="0" fill="hold" nodeType="withEffect">
-                                  <p:stCondLst>
-                                    <p:cond delay="0"/>
-                                  </p:stCondLst>
-                                  <p:childTnLst>
-                                    <p:set>
-                                      <p:cBhvr>
-                                        <p:cTn id="17" dur="1" fill="hold">
-                                          <p:stCondLst>
-                                            <p:cond delay="0"/>
-                                          </p:stCondLst>
-                                        </p:cTn>
-                                        <p:tgtEl>
-                                          <p:spTgt spid="7">
-                                            <p:txEl>
-                                              <p:pRg st="1" end="1"/>
-                                            </p:txEl>
-                                          </p:spTgt>
-                                        </p:tgtEl>
-                                        <p:attrNameLst>
-                                          <p:attrName>style.visibility</p:attrName>
-                                        </p:attrNameLst>
-                                      </p:cBhvr>
-                                      <p:to>
-                                        <p:strVal val="visible"/>
-                                      </p:to>
-                                    </p:set>
-                                    <p:animEffect transition="in" filter="fade">
-                                      <p:cBhvr>
-                                        <p:cTn id="18" dur="500"/>
-                                        <p:tgtEl>
-                                          <p:spTgt spid="7">
-                                            <p:txEl>
-                                              <p:pRg st="1" end="1"/>
-                                            </p:txEl>
-                                          </p:spTgt>
-                                        </p:tgtEl>
-                                      </p:cBhvr>
-                                    </p:animEffect>
-                                  </p:childTnLst>
-                                </p:cTn>
-                              </p:par>
-                              <p:par>
-                                <p:cTn id="19" presetID="10" presetClass="entr" presetSubtype="0" fill="hold" nodeType="withEffect">
-                                  <p:stCondLst>
-                                    <p:cond delay="0"/>
-                                  </p:stCondLst>
-                                  <p:childTnLst>
-                                    <p:set>
-                                      <p:cBhvr>
-                                        <p:cTn id="20" dur="1" fill="hold">
-                                          <p:stCondLst>
-                                            <p:cond delay="0"/>
-                                          </p:stCondLst>
-                                        </p:cTn>
-                                        <p:tgtEl>
-                                          <p:spTgt spid="7">
-                                            <p:txEl>
-                                              <p:pRg st="2" end="2"/>
-                                            </p:txEl>
-                                          </p:spTgt>
-                                        </p:tgtEl>
-                                        <p:attrNameLst>
-                                          <p:attrName>style.visibility</p:attrName>
-                                        </p:attrNameLst>
-                                      </p:cBhvr>
-                                      <p:to>
-                                        <p:strVal val="visible"/>
-                                      </p:to>
-                                    </p:set>
-                                    <p:animEffect transition="in" filter="fade">
-                                      <p:cBhvr>
-                                        <p:cTn id="21" dur="500"/>
-                                        <p:tgtEl>
-                                          <p:spTgt spid="7">
-                                            <p:txEl>
-                                              <p:pRg st="2" end="2"/>
-                                            </p:txEl>
-                                          </p:spTgt>
-                                        </p:tgtEl>
-                                      </p:cBhvr>
-                                    </p:animEffect>
-                                  </p:childTnLst>
-                                </p:cTn>
-                              </p:par>
-                            </p:childTnLst>
-                          </p:cTn>
-                        </p:par>
-                      </p:childTnLst>
-                    </p:cTn>
-                  </p:par>
-                  <p:par>
-                    <p:cTn id="22" fill="hold">
-                      <p:stCondLst>
-                        <p:cond delay="indefinite"/>
-                      </p:stCondLst>
-                      <p:childTnLst>
-                        <p:par>
-                          <p:cTn id="23" fill="hold">
-                            <p:stCondLst>
-                              <p:cond delay="0"/>
-                            </p:stCondLst>
-                            <p:childTnLst>
-                              <p:par>
-                                <p:cTn id="24" presetID="10" presetClass="entr" presetSubtype="0" fill="hold" nodeType="clickEffect">
-                                  <p:stCondLst>
-                                    <p:cond delay="0"/>
-                                  </p:stCondLst>
-                                  <p:childTnLst>
-                                    <p:set>
-                                      <p:cBhvr>
-                                        <p:cTn id="25" dur="1" fill="hold">
-                                          <p:stCondLst>
-                                            <p:cond delay="0"/>
-                                          </p:stCondLst>
-                                        </p:cTn>
-                                        <p:tgtEl>
-                                          <p:spTgt spid="7">
-                                            <p:txEl>
-                                              <p:pRg st="3" end="3"/>
-                                            </p:txEl>
-                                          </p:spTgt>
-                                        </p:tgtEl>
-                                        <p:attrNameLst>
-                                          <p:attrName>style.visibility</p:attrName>
-                                        </p:attrNameLst>
-                                      </p:cBhvr>
-                                      <p:to>
-                                        <p:strVal val="visible"/>
-                                      </p:to>
-                                    </p:set>
-                                    <p:animEffect transition="in" filter="fade">
-                                      <p:cBhvr>
-                                        <p:cTn id="26" dur="500"/>
-                                        <p:tgtEl>
-                                          <p:spTgt spid="7">
-                                            <p:txEl>
-                                              <p:pRg st="3" end="3"/>
-                                            </p:txEl>
-                                          </p:spTgt>
-                                        </p:tgtEl>
-                                      </p:cBhvr>
-                                    </p:animEffect>
-                                  </p:childTnLst>
-                                </p:cTn>
-                              </p:par>
-                            </p:childTnLst>
-                          </p:cTn>
-                        </p:par>
-                      </p:childTnLst>
-                    </p:cTn>
-                  </p:par>
-                  <p:par>
-                    <p:cTn id="27" fill="hold">
-                      <p:stCondLst>
-                        <p:cond delay="indefinite"/>
-                      </p:stCondLst>
-                      <p:childTnLst>
-                        <p:par>
-                          <p:cTn id="28" fill="hold">
-                            <p:stCondLst>
-                              <p:cond delay="0"/>
-                            </p:stCondLst>
-                            <p:childTnLst>
-                              <p:par>
-                                <p:cTn id="29" presetID="10" presetClass="entr" presetSubtype="0" fill="hold" nodeType="clickEffect">
-                                  <p:stCondLst>
-                                    <p:cond delay="0"/>
-                                  </p:stCondLst>
-                                  <p:childTnLst>
-                                    <p:set>
-                                      <p:cBhvr>
-                                        <p:cTn id="30" dur="1" fill="hold">
-                                          <p:stCondLst>
-                                            <p:cond delay="0"/>
-                                          </p:stCondLst>
-                                        </p:cTn>
-                                        <p:tgtEl>
-                                          <p:spTgt spid="7">
-                                            <p:txEl>
-                                              <p:pRg st="0" end="0"/>
-                                            </p:txEl>
-                                          </p:spTgt>
-                                        </p:tgtEl>
-                                        <p:attrNameLst>
-                                          <p:attrName>style.visibility</p:attrName>
-                                        </p:attrNameLst>
-                                      </p:cBhvr>
-                                      <p:to>
-                                        <p:strVal val="visible"/>
-                                      </p:to>
-                                    </p:set>
-                                    <p:animEffect transition="in" filter="fade">
-                                      <p:cBhvr>
-                                        <p:cTn id="31" dur="500"/>
-                                        <p:tgtEl>
-                                          <p:spTgt spid="7">
-                                            <p:txEl>
-                                              <p:pRg st="0" end="0"/>
-                                            </p:txEl>
-                                          </p:spTgt>
-                                        </p:tgtEl>
-                                      </p:cBhvr>
-                                    </p:animEffect>
-                                  </p:childTnLst>
-                                </p:cTn>
-                              </p:par>
-                              <p:par>
-                                <p:cTn id="32" presetID="10" presetClass="entr" presetSubtype="0" fill="hold" nodeType="withEffect">
-                                  <p:stCondLst>
-                                    <p:cond delay="0"/>
-                                  </p:stCondLst>
-                                  <p:childTnLst>
-                                    <p:set>
-                                      <p:cBhvr>
-                                        <p:cTn id="33" dur="1" fill="hold">
-                                          <p:stCondLst>
-                                            <p:cond delay="0"/>
-                                          </p:stCondLst>
-                                        </p:cTn>
-                                        <p:tgtEl>
-                                          <p:spTgt spid="7">
-                                            <p:txEl>
-                                              <p:pRg st="4" end="4"/>
-                                            </p:txEl>
-                                          </p:spTgt>
-                                        </p:tgtEl>
-                                        <p:attrNameLst>
-                                          <p:attrName>style.visibility</p:attrName>
-                                        </p:attrNameLst>
-                                      </p:cBhvr>
-                                      <p:to>
-                                        <p:strVal val="visible"/>
-                                      </p:to>
-                                    </p:set>
-                                    <p:animEffect transition="in" filter="fade">
-                                      <p:cBhvr>
-                                        <p:cTn id="34" dur="500"/>
-                                        <p:tgtEl>
-                                          <p:spTgt spid="7">
-                                            <p:txEl>
-                                              <p:pRg st="4" end="4"/>
-                                            </p:txEl>
-                                          </p:spTgt>
-                                        </p:tgtEl>
-                                      </p:cBhvr>
-                                    </p:animEffect>
-                                  </p:childTnLst>
-                                </p:cTn>
-                              </p:par>
-                            </p:childTnLst>
-                          </p:cTn>
-                        </p:par>
-                      </p:childTnLst>
-                    </p:cTn>
-                  </p:par>
-                  <p:par>
-                    <p:cTn id="35" fill="hold">
-                      <p:stCondLst>
-                        <p:cond delay="indefinite"/>
-                      </p:stCondLst>
-                      <p:childTnLst>
-                        <p:par>
-                          <p:cTn id="36" fill="hold">
-                            <p:stCondLst>
-                              <p:cond delay="0"/>
-                            </p:stCondLst>
-                            <p:childTnLst>
-                              <p:par>
-                                <p:cTn id="37" presetID="10" presetClass="entr" presetSubtype="0" fill="hold" nodeType="clickEffect">
-                                  <p:stCondLst>
-                                    <p:cond delay="0"/>
-                                  </p:stCondLst>
-                                  <p:childTnLst>
-                                    <p:set>
-                                      <p:cBhvr>
-                                        <p:cTn id="38" dur="1" fill="hold">
-                                          <p:stCondLst>
-                                            <p:cond delay="0"/>
-                                          </p:stCondLst>
-                                        </p:cTn>
-                                        <p:tgtEl>
-                                          <p:spTgt spid="26"/>
-                                        </p:tgtEl>
-                                        <p:attrNameLst>
-                                          <p:attrName>style.visibility</p:attrName>
-                                        </p:attrNameLst>
-                                      </p:cBhvr>
-                                      <p:to>
-                                        <p:strVal val="visible"/>
-                                      </p:to>
-                                    </p:set>
-                                    <p:animEffect transition="in" filter="fade">
-                                      <p:cBhvr>
-                                        <p:cTn id="39" dur="500"/>
-                                        <p:tgtEl>
-                                          <p:spTgt spid="26"/>
-                                        </p:tgtEl>
-                                      </p:cBhvr>
-                                    </p:animEffect>
-                                  </p:childTnLst>
-                                </p:cTn>
-                              </p:par>
-                            </p:childTnLst>
-                          </p:cTn>
-                        </p:par>
-                      </p:childTnLst>
-                    </p:cTn>
-                  </p:par>
-                </p:childTnLst>
-              </p:cTn>
-              <p:prevCondLst>
-                <p:cond evt="onPrev" delay="0">
-                  <p:tgtEl>
-                    <p:sldTgt/>
-                  </p:tgtEl>
-                </p:cond>
-              </p:prevCondLst>
-              <p:nextCondLst>
-                <p:cond evt="onNext" delay="0">
-                  <p:tgtEl>
-                    <p:sldTgt/>
-                  </p:tgtEl>
-                </p:cond>
-              </p:nextCondLst>
-            </p:seq>
-          </p:childTnLst>
-        </p:cTn>
-      </p:par>
-    </p:tnLst>
-    <p:bldLst>
-      <p:bldP spid="6" grpId="0" animBg="1"/>
-      <p:bldP spid="7" grpId="0" animBg="1"/>
-    </p:bldLst>
-  </p:timing>
-</p:sld>
-</file>
-
 <file path=ppt/theme/theme1.xml><?xml version="1.0" encoding="utf-8"?>
 <a:theme xmlns:a="http://schemas.openxmlformats.org/drawingml/2006/main" name="Office Theme">
   <a:themeElements>

</xml_diff>